<commit_message>
SemanticData Final release #351
- Pushed not saved Figures.pptx
</commit_message>
<xml_diff>
--- a/CommonResources/Media/Figures.pptx
+++ b/CommonResources/Media/Figures.pptx
@@ -288,6 +288,7 @@
           <a:p>
             <a:fld id="{DCD29016-2B0D-4C24-8AC7-581B9D6E3573}" type="datetimeFigureOut">
               <a:rPr lang="pl-PL" smtClean="0"/>
+              <a:pPr/>
               <a:t>21.07.2019</a:t>
             </a:fld>
             <a:endParaRPr lang="pl-PL"/>
@@ -330,6 +331,7 @@
           <a:p>
             <a:fld id="{06FD1629-3A9E-4F22-A6B8-90E4109657D8}" type="slidenum">
               <a:rPr lang="pl-PL" smtClean="0"/>
+              <a:pPr/>
               <a:t>‹#›</a:t>
             </a:fld>
             <a:endParaRPr lang="pl-PL"/>
@@ -453,6 +455,7 @@
           <a:p>
             <a:fld id="{DCD29016-2B0D-4C24-8AC7-581B9D6E3573}" type="datetimeFigureOut">
               <a:rPr lang="pl-PL" smtClean="0"/>
+              <a:pPr/>
               <a:t>21.07.2019</a:t>
             </a:fld>
             <a:endParaRPr lang="pl-PL"/>
@@ -495,6 +498,7 @@
           <a:p>
             <a:fld id="{06FD1629-3A9E-4F22-A6B8-90E4109657D8}" type="slidenum">
               <a:rPr lang="pl-PL" smtClean="0"/>
+              <a:pPr/>
               <a:t>‹#›</a:t>
             </a:fld>
             <a:endParaRPr lang="pl-PL"/>
@@ -628,6 +632,7 @@
           <a:p>
             <a:fld id="{DCD29016-2B0D-4C24-8AC7-581B9D6E3573}" type="datetimeFigureOut">
               <a:rPr lang="pl-PL" smtClean="0"/>
+              <a:pPr/>
               <a:t>21.07.2019</a:t>
             </a:fld>
             <a:endParaRPr lang="pl-PL"/>
@@ -670,6 +675,7 @@
           <a:p>
             <a:fld id="{06FD1629-3A9E-4F22-A6B8-90E4109657D8}" type="slidenum">
               <a:rPr lang="pl-PL" smtClean="0"/>
+              <a:pPr/>
               <a:t>‹#›</a:t>
             </a:fld>
             <a:endParaRPr lang="pl-PL"/>
@@ -793,6 +799,7 @@
           <a:p>
             <a:fld id="{DCD29016-2B0D-4C24-8AC7-581B9D6E3573}" type="datetimeFigureOut">
               <a:rPr lang="pl-PL" smtClean="0"/>
+              <a:pPr/>
               <a:t>21.07.2019</a:t>
             </a:fld>
             <a:endParaRPr lang="pl-PL"/>
@@ -835,6 +842,7 @@
           <a:p>
             <a:fld id="{06FD1629-3A9E-4F22-A6B8-90E4109657D8}" type="slidenum">
               <a:rPr lang="pl-PL" smtClean="0"/>
+              <a:pPr/>
               <a:t>‹#›</a:t>
             </a:fld>
             <a:endParaRPr lang="pl-PL"/>
@@ -1034,6 +1042,7 @@
           <a:p>
             <a:fld id="{DCD29016-2B0D-4C24-8AC7-581B9D6E3573}" type="datetimeFigureOut">
               <a:rPr lang="pl-PL" smtClean="0"/>
+              <a:pPr/>
               <a:t>21.07.2019</a:t>
             </a:fld>
             <a:endParaRPr lang="pl-PL"/>
@@ -1076,6 +1085,7 @@
           <a:p>
             <a:fld id="{06FD1629-3A9E-4F22-A6B8-90E4109657D8}" type="slidenum">
               <a:rPr lang="pl-PL" smtClean="0"/>
+              <a:pPr/>
               <a:t>‹#›</a:t>
             </a:fld>
             <a:endParaRPr lang="pl-PL"/>
@@ -1317,6 +1327,7 @@
           <a:p>
             <a:fld id="{DCD29016-2B0D-4C24-8AC7-581B9D6E3573}" type="datetimeFigureOut">
               <a:rPr lang="pl-PL" smtClean="0"/>
+              <a:pPr/>
               <a:t>21.07.2019</a:t>
             </a:fld>
             <a:endParaRPr lang="pl-PL"/>
@@ -1359,6 +1370,7 @@
           <a:p>
             <a:fld id="{06FD1629-3A9E-4F22-A6B8-90E4109657D8}" type="slidenum">
               <a:rPr lang="pl-PL" smtClean="0"/>
+              <a:pPr/>
               <a:t>‹#›</a:t>
             </a:fld>
             <a:endParaRPr lang="pl-PL"/>
@@ -1734,6 +1746,7 @@
           <a:p>
             <a:fld id="{DCD29016-2B0D-4C24-8AC7-581B9D6E3573}" type="datetimeFigureOut">
               <a:rPr lang="pl-PL" smtClean="0"/>
+              <a:pPr/>
               <a:t>21.07.2019</a:t>
             </a:fld>
             <a:endParaRPr lang="pl-PL"/>
@@ -1776,6 +1789,7 @@
           <a:p>
             <a:fld id="{06FD1629-3A9E-4F22-A6B8-90E4109657D8}" type="slidenum">
               <a:rPr lang="pl-PL" smtClean="0"/>
+              <a:pPr/>
               <a:t>‹#›</a:t>
             </a:fld>
             <a:endParaRPr lang="pl-PL"/>
@@ -1847,6 +1861,7 @@
           <a:p>
             <a:fld id="{DCD29016-2B0D-4C24-8AC7-581B9D6E3573}" type="datetimeFigureOut">
               <a:rPr lang="pl-PL" smtClean="0"/>
+              <a:pPr/>
               <a:t>21.07.2019</a:t>
             </a:fld>
             <a:endParaRPr lang="pl-PL"/>
@@ -1889,6 +1904,7 @@
           <a:p>
             <a:fld id="{06FD1629-3A9E-4F22-A6B8-90E4109657D8}" type="slidenum">
               <a:rPr lang="pl-PL" smtClean="0"/>
+              <a:pPr/>
               <a:t>‹#›</a:t>
             </a:fld>
             <a:endParaRPr lang="pl-PL"/>
@@ -1937,6 +1953,7 @@
           <a:p>
             <a:fld id="{DCD29016-2B0D-4C24-8AC7-581B9D6E3573}" type="datetimeFigureOut">
               <a:rPr lang="pl-PL" smtClean="0"/>
+              <a:pPr/>
               <a:t>21.07.2019</a:t>
             </a:fld>
             <a:endParaRPr lang="pl-PL"/>
@@ -1979,6 +1996,7 @@
           <a:p>
             <a:fld id="{06FD1629-3A9E-4F22-A6B8-90E4109657D8}" type="slidenum">
               <a:rPr lang="pl-PL" smtClean="0"/>
+              <a:pPr/>
               <a:t>‹#›</a:t>
             </a:fld>
             <a:endParaRPr lang="pl-PL"/>
@@ -2209,6 +2227,7 @@
           <a:p>
             <a:fld id="{DCD29016-2B0D-4C24-8AC7-581B9D6E3573}" type="datetimeFigureOut">
               <a:rPr lang="pl-PL" smtClean="0"/>
+              <a:pPr/>
               <a:t>21.07.2019</a:t>
             </a:fld>
             <a:endParaRPr lang="pl-PL"/>
@@ -2251,6 +2270,7 @@
           <a:p>
             <a:fld id="{06FD1629-3A9E-4F22-A6B8-90E4109657D8}" type="slidenum">
               <a:rPr lang="pl-PL" smtClean="0"/>
+              <a:pPr/>
               <a:t>‹#›</a:t>
             </a:fld>
             <a:endParaRPr lang="pl-PL"/>
@@ -2457,6 +2477,7 @@
           <a:p>
             <a:fld id="{DCD29016-2B0D-4C24-8AC7-581B9D6E3573}" type="datetimeFigureOut">
               <a:rPr lang="pl-PL" smtClean="0"/>
+              <a:pPr/>
               <a:t>21.07.2019</a:t>
             </a:fld>
             <a:endParaRPr lang="pl-PL"/>
@@ -2499,6 +2520,7 @@
           <a:p>
             <a:fld id="{06FD1629-3A9E-4F22-A6B8-90E4109657D8}" type="slidenum">
               <a:rPr lang="pl-PL" smtClean="0"/>
+              <a:pPr/>
               <a:t>‹#›</a:t>
             </a:fld>
             <a:endParaRPr lang="pl-PL"/>
@@ -2665,6 +2687,7 @@
           <a:p>
             <a:fld id="{DCD29016-2B0D-4C24-8AC7-581B9D6E3573}" type="datetimeFigureOut">
               <a:rPr lang="pl-PL" smtClean="0"/>
+              <a:pPr/>
               <a:t>21.07.2019</a:t>
             </a:fld>
             <a:endParaRPr lang="pl-PL"/>
@@ -2743,6 +2766,7 @@
           <a:p>
             <a:fld id="{06FD1629-3A9E-4F22-A6B8-90E4109657D8}" type="slidenum">
               <a:rPr lang="pl-PL" smtClean="0"/>
+              <a:pPr/>
               <a:t>‹#›</a:t>
             </a:fld>
             <a:endParaRPr lang="pl-PL"/>
@@ -3021,6 +3045,16 @@
 <file path=ppt/slides/slide1.xml><?xml version="1.0" encoding="utf-8"?>
 <p:sld xmlns:a="http://schemas.openxmlformats.org/drawingml/2006/main" xmlns:r="http://schemas.openxmlformats.org/officeDocument/2006/relationships" xmlns:p="http://schemas.openxmlformats.org/presentationml/2006/main">
   <p:cSld>
+    <p:bg>
+      <p:bgPr>
+        <a:solidFill>
+          <a:schemeClr val="bg1">
+            <a:alpha val="0"/>
+          </a:schemeClr>
+        </a:solidFill>
+        <a:effectLst/>
+      </p:bgPr>
+    </p:bg>
     <p:spTree>
       <p:nvGrpSpPr>
         <p:cNvPr id="1" name=""/>
@@ -3037,16 +3071,16 @@
       </p:grpSpPr>
       <p:grpSp>
         <p:nvGrpSpPr>
-          <p:cNvPr id="6" name="Grupa 5"/>
+          <p:cNvPr id="7" name="Grupa 6"/>
           <p:cNvGrpSpPr/>
           <p:nvPr/>
         </p:nvGrpSpPr>
         <p:grpSpPr>
           <a:xfrm>
-            <a:off x="2636374" y="3000429"/>
-            <a:ext cx="3871253" cy="857143"/>
-            <a:chOff x="4143428" y="3001296"/>
-            <a:chExt cx="3871253" cy="857143"/>
+            <a:off x="1874947" y="3000429"/>
+            <a:ext cx="5394106" cy="857143"/>
+            <a:chOff x="2636374" y="3024670"/>
+            <a:chExt cx="5394106" cy="857143"/>
           </a:xfrm>
         </p:grpSpPr>
         <p:pic>
@@ -3065,7 +3099,7 @@
           </p:blipFill>
           <p:spPr>
             <a:xfrm>
-              <a:off x="4143428" y="3001296"/>
+              <a:off x="2636374" y="3024670"/>
               <a:ext cx="857143" cy="857143"/>
             </a:xfrm>
             <a:prstGeom prst="rect">
@@ -3081,8 +3115,8 @@
           </p:nvSpPr>
           <p:spPr>
             <a:xfrm>
-              <a:off x="5076056" y="3106702"/>
-              <a:ext cx="2938625" cy="646331"/>
+              <a:off x="3569002" y="3053132"/>
+              <a:ext cx="4461478" cy="800219"/>
             </a:xfrm>
             <a:prstGeom prst="rect">
               <a:avLst/>
@@ -3096,12 +3130,12 @@
             <a:lstStyle/>
             <a:p>
               <a:r>
-                <a:rPr lang="en-US" dirty="0" smtClean="0">
+                <a:rPr lang="en-US" sz="2800" dirty="0" smtClean="0">
                   <a:latin typeface="Georgia Pro Semibold" pitchFamily="18" charset="0"/>
                 </a:rPr>
                 <a:t>Object-Oriented Internet</a:t>
               </a:r>
-              <a:endParaRPr lang="pl-PL" dirty="0" smtClean="0">
+              <a:endParaRPr lang="pl-PL" sz="2800" dirty="0" smtClean="0">
                 <a:latin typeface="Georgia Pro Semibold" pitchFamily="18" charset="0"/>
               </a:endParaRPr>
             </a:p>

</xml_diff>

<commit_message>
Improve project graphics #411
- Upgraded graphic
- fixed typo in InformationModelConcept.md
</commit_message>
<xml_diff>
--- a/CommonResources/Media/Figures.pptx
+++ b/CommonResources/Media/Figures.pptx
@@ -104,6 +104,22 @@
       </a:defRPr>
     </a:lvl9pPr>
   </p:defaultTextStyle>
+  <p:extLst>
+    <p:ext uri="{EFAFB233-063F-42B5-8137-9DF3F51BA10A}">
+      <p15:sldGuideLst xmlns:p15="http://schemas.microsoft.com/office/powerpoint/2012/main">
+        <p15:guide id="1" orient="horz" pos="2160">
+          <p15:clr>
+            <a:srgbClr val="A4A3A4"/>
+          </p15:clr>
+        </p15:guide>
+        <p15:guide id="2" pos="2880">
+          <p15:clr>
+            <a:srgbClr val="A4A3A4"/>
+          </p15:clr>
+        </p15:guide>
+      </p15:sldGuideLst>
+    </p:ext>
+  </p:extLst>
 </p:presentation>
 </file>
 
@@ -145,10 +161,9 @@
           <a:lstStyle/>
           <a:p>
             <a:r>
-              <a:rPr lang="pl-PL" smtClean="0"/>
+              <a:rPr lang="pl-PL"/>
               <a:t>Kliknij, aby edytować styl</a:t>
             </a:r>
-            <a:endParaRPr lang="pl-PL"/>
           </a:p>
         </p:txBody>
       </p:sp>
@@ -264,10 +279,9 @@
           </a:lstStyle>
           <a:p>
             <a:r>
-              <a:rPr lang="pl-PL" smtClean="0"/>
+              <a:rPr lang="pl-PL"/>
               <a:t>Kliknij, aby edytować styl wzorca podtytułu</a:t>
             </a:r>
-            <a:endParaRPr lang="pl-PL"/>
           </a:p>
         </p:txBody>
       </p:sp>
@@ -289,7 +303,7 @@
             <a:fld id="{DCD29016-2B0D-4C24-8AC7-581B9D6E3573}" type="datetimeFigureOut">
               <a:rPr lang="pl-PL" smtClean="0"/>
               <a:pPr/>
-              <a:t>21.07.2019</a:t>
+              <a:t>17.12.2019</a:t>
             </a:fld>
             <a:endParaRPr lang="pl-PL"/>
           </a:p>
@@ -379,10 +393,9 @@
           <a:lstStyle/>
           <a:p>
             <a:r>
-              <a:rPr lang="pl-PL" smtClean="0"/>
+              <a:rPr lang="pl-PL"/>
               <a:t>Kliknij, aby edytować styl</a:t>
             </a:r>
-            <a:endParaRPr lang="pl-PL"/>
           </a:p>
         </p:txBody>
       </p:sp>
@@ -403,38 +416,37 @@
           <a:p>
             <a:pPr lvl="0"/>
             <a:r>
-              <a:rPr lang="pl-PL" smtClean="0"/>
+              <a:rPr lang="pl-PL"/>
               <a:t>Kliknij, aby edytować style wzorca tekstu</a:t>
             </a:r>
           </a:p>
           <a:p>
             <a:pPr lvl="1"/>
             <a:r>
-              <a:rPr lang="pl-PL" smtClean="0"/>
+              <a:rPr lang="pl-PL"/>
               <a:t>Drugi poziom</a:t>
             </a:r>
           </a:p>
           <a:p>
             <a:pPr lvl="2"/>
             <a:r>
-              <a:rPr lang="pl-PL" smtClean="0"/>
+              <a:rPr lang="pl-PL"/>
               <a:t>Trzeci poziom</a:t>
             </a:r>
           </a:p>
           <a:p>
             <a:pPr lvl="3"/>
             <a:r>
-              <a:rPr lang="pl-PL" smtClean="0"/>
+              <a:rPr lang="pl-PL"/>
               <a:t>Czwarty poziom</a:t>
             </a:r>
           </a:p>
           <a:p>
             <a:pPr lvl="4"/>
             <a:r>
-              <a:rPr lang="pl-PL" smtClean="0"/>
+              <a:rPr lang="pl-PL"/>
               <a:t>Piąty poziom</a:t>
             </a:r>
-            <a:endParaRPr lang="pl-PL"/>
           </a:p>
         </p:txBody>
       </p:sp>
@@ -456,7 +468,7 @@
             <a:fld id="{DCD29016-2B0D-4C24-8AC7-581B9D6E3573}" type="datetimeFigureOut">
               <a:rPr lang="pl-PL" smtClean="0"/>
               <a:pPr/>
-              <a:t>21.07.2019</a:t>
+              <a:t>17.12.2019</a:t>
             </a:fld>
             <a:endParaRPr lang="pl-PL"/>
           </a:p>
@@ -551,10 +563,9 @@
           <a:lstStyle/>
           <a:p>
             <a:r>
-              <a:rPr lang="pl-PL" smtClean="0"/>
+              <a:rPr lang="pl-PL"/>
               <a:t>Kliknij, aby edytować styl</a:t>
             </a:r>
-            <a:endParaRPr lang="pl-PL"/>
           </a:p>
         </p:txBody>
       </p:sp>
@@ -580,38 +591,37 @@
           <a:p>
             <a:pPr lvl="0"/>
             <a:r>
-              <a:rPr lang="pl-PL" smtClean="0"/>
+              <a:rPr lang="pl-PL"/>
               <a:t>Kliknij, aby edytować style wzorca tekstu</a:t>
             </a:r>
           </a:p>
           <a:p>
             <a:pPr lvl="1"/>
             <a:r>
-              <a:rPr lang="pl-PL" smtClean="0"/>
+              <a:rPr lang="pl-PL"/>
               <a:t>Drugi poziom</a:t>
             </a:r>
           </a:p>
           <a:p>
             <a:pPr lvl="2"/>
             <a:r>
-              <a:rPr lang="pl-PL" smtClean="0"/>
+              <a:rPr lang="pl-PL"/>
               <a:t>Trzeci poziom</a:t>
             </a:r>
           </a:p>
           <a:p>
             <a:pPr lvl="3"/>
             <a:r>
-              <a:rPr lang="pl-PL" smtClean="0"/>
+              <a:rPr lang="pl-PL"/>
               <a:t>Czwarty poziom</a:t>
             </a:r>
           </a:p>
           <a:p>
             <a:pPr lvl="4"/>
             <a:r>
-              <a:rPr lang="pl-PL" smtClean="0"/>
+              <a:rPr lang="pl-PL"/>
               <a:t>Piąty poziom</a:t>
             </a:r>
-            <a:endParaRPr lang="pl-PL"/>
           </a:p>
         </p:txBody>
       </p:sp>
@@ -633,7 +643,7 @@
             <a:fld id="{DCD29016-2B0D-4C24-8AC7-581B9D6E3573}" type="datetimeFigureOut">
               <a:rPr lang="pl-PL" smtClean="0"/>
               <a:pPr/>
-              <a:t>21.07.2019</a:t>
+              <a:t>17.12.2019</a:t>
             </a:fld>
             <a:endParaRPr lang="pl-PL"/>
           </a:p>
@@ -723,10 +733,9 @@
           <a:lstStyle/>
           <a:p>
             <a:r>
-              <a:rPr lang="pl-PL" smtClean="0"/>
+              <a:rPr lang="pl-PL"/>
               <a:t>Kliknij, aby edytować styl</a:t>
             </a:r>
-            <a:endParaRPr lang="pl-PL"/>
           </a:p>
         </p:txBody>
       </p:sp>
@@ -747,38 +756,37 @@
           <a:p>
             <a:pPr lvl="0"/>
             <a:r>
-              <a:rPr lang="pl-PL" smtClean="0"/>
+              <a:rPr lang="pl-PL"/>
               <a:t>Kliknij, aby edytować style wzorca tekstu</a:t>
             </a:r>
           </a:p>
           <a:p>
             <a:pPr lvl="1"/>
             <a:r>
-              <a:rPr lang="pl-PL" smtClean="0"/>
+              <a:rPr lang="pl-PL"/>
               <a:t>Drugi poziom</a:t>
             </a:r>
           </a:p>
           <a:p>
             <a:pPr lvl="2"/>
             <a:r>
-              <a:rPr lang="pl-PL" smtClean="0"/>
+              <a:rPr lang="pl-PL"/>
               <a:t>Trzeci poziom</a:t>
             </a:r>
           </a:p>
           <a:p>
             <a:pPr lvl="3"/>
             <a:r>
-              <a:rPr lang="pl-PL" smtClean="0"/>
+              <a:rPr lang="pl-PL"/>
               <a:t>Czwarty poziom</a:t>
             </a:r>
           </a:p>
           <a:p>
             <a:pPr lvl="4"/>
             <a:r>
-              <a:rPr lang="pl-PL" smtClean="0"/>
+              <a:rPr lang="pl-PL"/>
               <a:t>Piąty poziom</a:t>
             </a:r>
-            <a:endParaRPr lang="pl-PL"/>
           </a:p>
         </p:txBody>
       </p:sp>
@@ -800,7 +808,7 @@
             <a:fld id="{DCD29016-2B0D-4C24-8AC7-581B9D6E3573}" type="datetimeFigureOut">
               <a:rPr lang="pl-PL" smtClean="0"/>
               <a:pPr/>
-              <a:t>21.07.2019</a:t>
+              <a:t>17.12.2019</a:t>
             </a:fld>
             <a:endParaRPr lang="pl-PL"/>
           </a:p>
@@ -899,10 +907,9 @@
           </a:lstStyle>
           <a:p>
             <a:r>
-              <a:rPr lang="pl-PL" smtClean="0"/>
+              <a:rPr lang="pl-PL"/>
               <a:t>Kliknij, aby edytować styl</a:t>
             </a:r>
-            <a:endParaRPr lang="pl-PL"/>
           </a:p>
         </p:txBody>
       </p:sp>
@@ -1019,7 +1026,7 @@
           <a:p>
             <a:pPr lvl="0"/>
             <a:r>
-              <a:rPr lang="pl-PL" smtClean="0"/>
+              <a:rPr lang="pl-PL"/>
               <a:t>Kliknij, aby edytować style wzorca tekstu</a:t>
             </a:r>
           </a:p>
@@ -1043,7 +1050,7 @@
             <a:fld id="{DCD29016-2B0D-4C24-8AC7-581B9D6E3573}" type="datetimeFigureOut">
               <a:rPr lang="pl-PL" smtClean="0"/>
               <a:pPr/>
-              <a:t>21.07.2019</a:t>
+              <a:t>17.12.2019</a:t>
             </a:fld>
             <a:endParaRPr lang="pl-PL"/>
           </a:p>
@@ -1133,10 +1140,9 @@
           <a:lstStyle/>
           <a:p>
             <a:r>
-              <a:rPr lang="pl-PL" smtClean="0"/>
+              <a:rPr lang="pl-PL"/>
               <a:t>Kliknij, aby edytować styl</a:t>
             </a:r>
-            <a:endParaRPr lang="pl-PL"/>
           </a:p>
         </p:txBody>
       </p:sp>
@@ -1190,38 +1196,37 @@
           <a:p>
             <a:pPr lvl="0"/>
             <a:r>
-              <a:rPr lang="pl-PL" smtClean="0"/>
+              <a:rPr lang="pl-PL"/>
               <a:t>Kliknij, aby edytować style wzorca tekstu</a:t>
             </a:r>
           </a:p>
           <a:p>
             <a:pPr lvl="1"/>
             <a:r>
-              <a:rPr lang="pl-PL" smtClean="0"/>
+              <a:rPr lang="pl-PL"/>
               <a:t>Drugi poziom</a:t>
             </a:r>
           </a:p>
           <a:p>
             <a:pPr lvl="2"/>
             <a:r>
-              <a:rPr lang="pl-PL" smtClean="0"/>
+              <a:rPr lang="pl-PL"/>
               <a:t>Trzeci poziom</a:t>
             </a:r>
           </a:p>
           <a:p>
             <a:pPr lvl="3"/>
             <a:r>
-              <a:rPr lang="pl-PL" smtClean="0"/>
+              <a:rPr lang="pl-PL"/>
               <a:t>Czwarty poziom</a:t>
             </a:r>
           </a:p>
           <a:p>
             <a:pPr lvl="4"/>
             <a:r>
-              <a:rPr lang="pl-PL" smtClean="0"/>
+              <a:rPr lang="pl-PL"/>
               <a:t>Piąty poziom</a:t>
             </a:r>
-            <a:endParaRPr lang="pl-PL"/>
           </a:p>
         </p:txBody>
       </p:sp>
@@ -1275,38 +1280,37 @@
           <a:p>
             <a:pPr lvl="0"/>
             <a:r>
-              <a:rPr lang="pl-PL" smtClean="0"/>
+              <a:rPr lang="pl-PL"/>
               <a:t>Kliknij, aby edytować style wzorca tekstu</a:t>
             </a:r>
           </a:p>
           <a:p>
             <a:pPr lvl="1"/>
             <a:r>
-              <a:rPr lang="pl-PL" smtClean="0"/>
+              <a:rPr lang="pl-PL"/>
               <a:t>Drugi poziom</a:t>
             </a:r>
           </a:p>
           <a:p>
             <a:pPr lvl="2"/>
             <a:r>
-              <a:rPr lang="pl-PL" smtClean="0"/>
+              <a:rPr lang="pl-PL"/>
               <a:t>Trzeci poziom</a:t>
             </a:r>
           </a:p>
           <a:p>
             <a:pPr lvl="3"/>
             <a:r>
-              <a:rPr lang="pl-PL" smtClean="0"/>
+              <a:rPr lang="pl-PL"/>
               <a:t>Czwarty poziom</a:t>
             </a:r>
           </a:p>
           <a:p>
             <a:pPr lvl="4"/>
             <a:r>
-              <a:rPr lang="pl-PL" smtClean="0"/>
+              <a:rPr lang="pl-PL"/>
               <a:t>Piąty poziom</a:t>
             </a:r>
-            <a:endParaRPr lang="pl-PL"/>
           </a:p>
         </p:txBody>
       </p:sp>
@@ -1328,7 +1332,7 @@
             <a:fld id="{DCD29016-2B0D-4C24-8AC7-581B9D6E3573}" type="datetimeFigureOut">
               <a:rPr lang="pl-PL" smtClean="0"/>
               <a:pPr/>
-              <a:t>21.07.2019</a:t>
+              <a:t>17.12.2019</a:t>
             </a:fld>
             <a:endParaRPr lang="pl-PL"/>
           </a:p>
@@ -1422,10 +1426,9 @@
           </a:lstStyle>
           <a:p>
             <a:r>
-              <a:rPr lang="pl-PL" smtClean="0"/>
+              <a:rPr lang="pl-PL"/>
               <a:t>Kliknij, aby edytować styl</a:t>
             </a:r>
-            <a:endParaRPr lang="pl-PL"/>
           </a:p>
         </p:txBody>
       </p:sp>
@@ -1488,7 +1491,7 @@
           <a:p>
             <a:pPr lvl="0"/>
             <a:r>
-              <a:rPr lang="pl-PL" smtClean="0"/>
+              <a:rPr lang="pl-PL"/>
               <a:t>Kliknij, aby edytować style wzorca tekstu</a:t>
             </a:r>
           </a:p>
@@ -1544,38 +1547,37 @@
           <a:p>
             <a:pPr lvl="0"/>
             <a:r>
-              <a:rPr lang="pl-PL" smtClean="0"/>
+              <a:rPr lang="pl-PL"/>
               <a:t>Kliknij, aby edytować style wzorca tekstu</a:t>
             </a:r>
           </a:p>
           <a:p>
             <a:pPr lvl="1"/>
             <a:r>
-              <a:rPr lang="pl-PL" smtClean="0"/>
+              <a:rPr lang="pl-PL"/>
               <a:t>Drugi poziom</a:t>
             </a:r>
           </a:p>
           <a:p>
             <a:pPr lvl="2"/>
             <a:r>
-              <a:rPr lang="pl-PL" smtClean="0"/>
+              <a:rPr lang="pl-PL"/>
               <a:t>Trzeci poziom</a:t>
             </a:r>
           </a:p>
           <a:p>
             <a:pPr lvl="3"/>
             <a:r>
-              <a:rPr lang="pl-PL" smtClean="0"/>
+              <a:rPr lang="pl-PL"/>
               <a:t>Czwarty poziom</a:t>
             </a:r>
           </a:p>
           <a:p>
             <a:pPr lvl="4"/>
             <a:r>
-              <a:rPr lang="pl-PL" smtClean="0"/>
+              <a:rPr lang="pl-PL"/>
               <a:t>Piąty poziom</a:t>
             </a:r>
-            <a:endParaRPr lang="pl-PL"/>
           </a:p>
         </p:txBody>
       </p:sp>
@@ -1638,7 +1640,7 @@
           <a:p>
             <a:pPr lvl="0"/>
             <a:r>
-              <a:rPr lang="pl-PL" smtClean="0"/>
+              <a:rPr lang="pl-PL"/>
               <a:t>Kliknij, aby edytować style wzorca tekstu</a:t>
             </a:r>
           </a:p>
@@ -1694,38 +1696,37 @@
           <a:p>
             <a:pPr lvl="0"/>
             <a:r>
-              <a:rPr lang="pl-PL" smtClean="0"/>
+              <a:rPr lang="pl-PL"/>
               <a:t>Kliknij, aby edytować style wzorca tekstu</a:t>
             </a:r>
           </a:p>
           <a:p>
             <a:pPr lvl="1"/>
             <a:r>
-              <a:rPr lang="pl-PL" smtClean="0"/>
+              <a:rPr lang="pl-PL"/>
               <a:t>Drugi poziom</a:t>
             </a:r>
           </a:p>
           <a:p>
             <a:pPr lvl="2"/>
             <a:r>
-              <a:rPr lang="pl-PL" smtClean="0"/>
+              <a:rPr lang="pl-PL"/>
               <a:t>Trzeci poziom</a:t>
             </a:r>
           </a:p>
           <a:p>
             <a:pPr lvl="3"/>
             <a:r>
-              <a:rPr lang="pl-PL" smtClean="0"/>
+              <a:rPr lang="pl-PL"/>
               <a:t>Czwarty poziom</a:t>
             </a:r>
           </a:p>
           <a:p>
             <a:pPr lvl="4"/>
             <a:r>
-              <a:rPr lang="pl-PL" smtClean="0"/>
+              <a:rPr lang="pl-PL"/>
               <a:t>Piąty poziom</a:t>
             </a:r>
-            <a:endParaRPr lang="pl-PL"/>
           </a:p>
         </p:txBody>
       </p:sp>
@@ -1747,7 +1748,7 @@
             <a:fld id="{DCD29016-2B0D-4C24-8AC7-581B9D6E3573}" type="datetimeFigureOut">
               <a:rPr lang="pl-PL" smtClean="0"/>
               <a:pPr/>
-              <a:t>21.07.2019</a:t>
+              <a:t>17.12.2019</a:t>
             </a:fld>
             <a:endParaRPr lang="pl-PL"/>
           </a:p>
@@ -1837,10 +1838,9 @@
           <a:lstStyle/>
           <a:p>
             <a:r>
-              <a:rPr lang="pl-PL" smtClean="0"/>
+              <a:rPr lang="pl-PL"/>
               <a:t>Kliknij, aby edytować styl</a:t>
             </a:r>
-            <a:endParaRPr lang="pl-PL"/>
           </a:p>
         </p:txBody>
       </p:sp>
@@ -1862,7 +1862,7 @@
             <a:fld id="{DCD29016-2B0D-4C24-8AC7-581B9D6E3573}" type="datetimeFigureOut">
               <a:rPr lang="pl-PL" smtClean="0"/>
               <a:pPr/>
-              <a:t>21.07.2019</a:t>
+              <a:t>17.12.2019</a:t>
             </a:fld>
             <a:endParaRPr lang="pl-PL"/>
           </a:p>
@@ -1954,7 +1954,7 @@
             <a:fld id="{DCD29016-2B0D-4C24-8AC7-581B9D6E3573}" type="datetimeFigureOut">
               <a:rPr lang="pl-PL" smtClean="0"/>
               <a:pPr/>
-              <a:t>21.07.2019</a:t>
+              <a:t>17.12.2019</a:t>
             </a:fld>
             <a:endParaRPr lang="pl-PL"/>
           </a:p>
@@ -2053,10 +2053,9 @@
           </a:lstStyle>
           <a:p>
             <a:r>
-              <a:rPr lang="pl-PL" smtClean="0"/>
+              <a:rPr lang="pl-PL"/>
               <a:t>Kliknij, aby edytować styl</a:t>
             </a:r>
-            <a:endParaRPr lang="pl-PL"/>
           </a:p>
         </p:txBody>
       </p:sp>
@@ -2110,38 +2109,37 @@
           <a:p>
             <a:pPr lvl="0"/>
             <a:r>
-              <a:rPr lang="pl-PL" smtClean="0"/>
+              <a:rPr lang="pl-PL"/>
               <a:t>Kliknij, aby edytować style wzorca tekstu</a:t>
             </a:r>
           </a:p>
           <a:p>
             <a:pPr lvl="1"/>
             <a:r>
-              <a:rPr lang="pl-PL" smtClean="0"/>
+              <a:rPr lang="pl-PL"/>
               <a:t>Drugi poziom</a:t>
             </a:r>
           </a:p>
           <a:p>
             <a:pPr lvl="2"/>
             <a:r>
-              <a:rPr lang="pl-PL" smtClean="0"/>
+              <a:rPr lang="pl-PL"/>
               <a:t>Trzeci poziom</a:t>
             </a:r>
           </a:p>
           <a:p>
             <a:pPr lvl="3"/>
             <a:r>
-              <a:rPr lang="pl-PL" smtClean="0"/>
+              <a:rPr lang="pl-PL"/>
               <a:t>Czwarty poziom</a:t>
             </a:r>
           </a:p>
           <a:p>
             <a:pPr lvl="4"/>
             <a:r>
-              <a:rPr lang="pl-PL" smtClean="0"/>
+              <a:rPr lang="pl-PL"/>
               <a:t>Piąty poziom</a:t>
             </a:r>
-            <a:endParaRPr lang="pl-PL"/>
           </a:p>
         </p:txBody>
       </p:sp>
@@ -2204,7 +2202,7 @@
           <a:p>
             <a:pPr lvl="0"/>
             <a:r>
-              <a:rPr lang="pl-PL" smtClean="0"/>
+              <a:rPr lang="pl-PL"/>
               <a:t>Kliknij, aby edytować style wzorca tekstu</a:t>
             </a:r>
           </a:p>
@@ -2228,7 +2226,7 @@
             <a:fld id="{DCD29016-2B0D-4C24-8AC7-581B9D6E3573}" type="datetimeFigureOut">
               <a:rPr lang="pl-PL" smtClean="0"/>
               <a:pPr/>
-              <a:t>21.07.2019</a:t>
+              <a:t>17.12.2019</a:t>
             </a:fld>
             <a:endParaRPr lang="pl-PL"/>
           </a:p>
@@ -2327,10 +2325,9 @@
           </a:lstStyle>
           <a:p>
             <a:r>
-              <a:rPr lang="pl-PL" smtClean="0"/>
+              <a:rPr lang="pl-PL"/>
               <a:t>Kliknij, aby edytować styl</a:t>
             </a:r>
-            <a:endParaRPr lang="pl-PL"/>
           </a:p>
         </p:txBody>
       </p:sp>
@@ -2454,7 +2451,7 @@
           <a:p>
             <a:pPr lvl="0"/>
             <a:r>
-              <a:rPr lang="pl-PL" smtClean="0"/>
+              <a:rPr lang="pl-PL"/>
               <a:t>Kliknij, aby edytować style wzorca tekstu</a:t>
             </a:r>
           </a:p>
@@ -2478,7 +2475,7 @@
             <a:fld id="{DCD29016-2B0D-4C24-8AC7-581B9D6E3573}" type="datetimeFigureOut">
               <a:rPr lang="pl-PL" smtClean="0"/>
               <a:pPr/>
-              <a:t>21.07.2019</a:t>
+              <a:t>17.12.2019</a:t>
             </a:fld>
             <a:endParaRPr lang="pl-PL"/>
           </a:p>
@@ -2539,9 +2536,14 @@
 <p:sldMaster xmlns:a="http://schemas.openxmlformats.org/drawingml/2006/main" xmlns:r="http://schemas.openxmlformats.org/officeDocument/2006/relationships" xmlns:p="http://schemas.openxmlformats.org/presentationml/2006/main">
   <p:cSld>
     <p:bg>
-      <p:bgRef idx="1001">
-        <a:schemeClr val="bg1"/>
-      </p:bgRef>
+      <p:bgPr>
+        <a:solidFill>
+          <a:schemeClr val="bg1">
+            <a:lumMod val="85000"/>
+          </a:schemeClr>
+        </a:solidFill>
+        <a:effectLst/>
+      </p:bgPr>
     </p:bg>
     <p:spTree>
       <p:nvGrpSpPr>
@@ -2583,10 +2585,9 @@
           <a:lstStyle/>
           <a:p>
             <a:r>
-              <a:rPr lang="pl-PL" smtClean="0"/>
+              <a:rPr lang="pl-PL"/>
               <a:t>Kliknij, aby edytować styl</a:t>
             </a:r>
-            <a:endParaRPr lang="pl-PL"/>
           </a:p>
         </p:txBody>
       </p:sp>
@@ -2617,38 +2618,37 @@
           <a:p>
             <a:pPr lvl="0"/>
             <a:r>
-              <a:rPr lang="pl-PL" smtClean="0"/>
+              <a:rPr lang="pl-PL"/>
               <a:t>Kliknij, aby edytować style wzorca tekstu</a:t>
             </a:r>
           </a:p>
           <a:p>
             <a:pPr lvl="1"/>
             <a:r>
-              <a:rPr lang="pl-PL" smtClean="0"/>
+              <a:rPr lang="pl-PL"/>
               <a:t>Drugi poziom</a:t>
             </a:r>
           </a:p>
           <a:p>
             <a:pPr lvl="2"/>
             <a:r>
-              <a:rPr lang="pl-PL" smtClean="0"/>
+              <a:rPr lang="pl-PL"/>
               <a:t>Trzeci poziom</a:t>
             </a:r>
           </a:p>
           <a:p>
             <a:pPr lvl="3"/>
             <a:r>
-              <a:rPr lang="pl-PL" smtClean="0"/>
+              <a:rPr lang="pl-PL"/>
               <a:t>Czwarty poziom</a:t>
             </a:r>
           </a:p>
           <a:p>
             <a:pPr lvl="4"/>
             <a:r>
-              <a:rPr lang="pl-PL" smtClean="0"/>
+              <a:rPr lang="pl-PL"/>
               <a:t>Piąty poziom</a:t>
             </a:r>
-            <a:endParaRPr lang="pl-PL"/>
           </a:p>
         </p:txBody>
       </p:sp>
@@ -2688,7 +2688,7 @@
             <a:fld id="{DCD29016-2B0D-4C24-8AC7-581B9D6E3573}" type="datetimeFigureOut">
               <a:rPr lang="pl-PL" smtClean="0"/>
               <a:pPr/>
-              <a:t>21.07.2019</a:t>
+              <a:t>17.12.2019</a:t>
             </a:fld>
             <a:endParaRPr lang="pl-PL"/>
           </a:p>
@@ -3045,16 +3045,6 @@
 <file path=ppt/slides/slide1.xml><?xml version="1.0" encoding="utf-8"?>
 <p:sld xmlns:a="http://schemas.openxmlformats.org/drawingml/2006/main" xmlns:r="http://schemas.openxmlformats.org/officeDocument/2006/relationships" xmlns:p="http://schemas.openxmlformats.org/presentationml/2006/main">
   <p:cSld>
-    <p:bg>
-      <p:bgPr>
-        <a:solidFill>
-          <a:schemeClr val="bg1">
-            <a:alpha val="0"/>
-          </a:schemeClr>
-        </a:solidFill>
-        <a:effectLst/>
-      </p:bgPr>
-    </p:bg>
     <p:spTree>
       <p:nvGrpSpPr>
         <p:cNvPr id="1" name=""/>
@@ -3130,30 +3120,30 @@
             <a:lstStyle/>
             <a:p>
               <a:r>
-                <a:rPr lang="en-US" sz="2800" dirty="0" smtClean="0">
+                <a:rPr lang="en-US" sz="2800" dirty="0">
                   <a:latin typeface="Georgia Pro Semibold" pitchFamily="18" charset="0"/>
                 </a:rPr>
                 <a:t>Object-Oriented Internet</a:t>
               </a:r>
-              <a:endParaRPr lang="pl-PL" sz="2800" dirty="0" smtClean="0">
+              <a:endParaRPr lang="pl-PL" sz="2800" dirty="0">
                 <a:latin typeface="Georgia Pro Semibold" pitchFamily="18" charset="0"/>
               </a:endParaRPr>
             </a:p>
             <a:p>
               <a:r>
-                <a:rPr lang="pl-PL" dirty="0" smtClean="0">
+                <a:rPr lang="pl-PL" dirty="0">
                   <a:latin typeface="Georgia Pro Semibold" pitchFamily="18" charset="0"/>
                 </a:rPr>
-                <a:t>DOA, M2M, </a:t>
+                <a:t>OPC UA, DOA, M2M, </a:t>
               </a:r>
               <a:r>
-                <a:rPr lang="pl-PL" dirty="0" err="1" smtClean="0">
+                <a:rPr lang="pl-PL" dirty="0" err="1">
                   <a:latin typeface="Georgia Pro Semibold" pitchFamily="18" charset="0"/>
                 </a:rPr>
                 <a:t>IoT</a:t>
               </a:r>
               <a:r>
-                <a:rPr lang="pl-PL" dirty="0" smtClean="0">
+                <a:rPr lang="pl-PL" dirty="0">
                   <a:latin typeface="Georgia Pro Semibold" pitchFamily="18" charset="0"/>
                 </a:rPr>
                 <a:t>, I40</a:t>

</xml_diff>

<commit_message>
Create the landing page of the Sponsorship Program #414
- working on html static pages
</commit_message>
<xml_diff>
--- a/CommonResources/Media/Figures.pptx
+++ b/CommonResources/Media/Figures.pptx
@@ -6,6 +6,9 @@
   </p:sldMasterIdLst>
   <p:sldIdLst>
     <p:sldId id="256" r:id="rId2"/>
+    <p:sldId id="257" r:id="rId3"/>
+    <p:sldId id="258" r:id="rId4"/>
+    <p:sldId id="259" r:id="rId5"/>
   </p:sldIdLst>
   <p:sldSz cx="9144000" cy="6858000" type="screen4x3"/>
   <p:notesSz cx="6858000" cy="9144000"/>
@@ -303,7 +306,7 @@
             <a:fld id="{DCD29016-2B0D-4C24-8AC7-581B9D6E3573}" type="datetimeFigureOut">
               <a:rPr lang="pl-PL" smtClean="0"/>
               <a:pPr/>
-              <a:t>17.12.2019</a:t>
+              <a:t>01.01.2020</a:t>
             </a:fld>
             <a:endParaRPr lang="pl-PL"/>
           </a:p>
@@ -468,7 +471,7 @@
             <a:fld id="{DCD29016-2B0D-4C24-8AC7-581B9D6E3573}" type="datetimeFigureOut">
               <a:rPr lang="pl-PL" smtClean="0"/>
               <a:pPr/>
-              <a:t>17.12.2019</a:t>
+              <a:t>01.01.2020</a:t>
             </a:fld>
             <a:endParaRPr lang="pl-PL"/>
           </a:p>
@@ -643,7 +646,7 @@
             <a:fld id="{DCD29016-2B0D-4C24-8AC7-581B9D6E3573}" type="datetimeFigureOut">
               <a:rPr lang="pl-PL" smtClean="0"/>
               <a:pPr/>
-              <a:t>17.12.2019</a:t>
+              <a:t>01.01.2020</a:t>
             </a:fld>
             <a:endParaRPr lang="pl-PL"/>
           </a:p>
@@ -808,7 +811,7 @@
             <a:fld id="{DCD29016-2B0D-4C24-8AC7-581B9D6E3573}" type="datetimeFigureOut">
               <a:rPr lang="pl-PL" smtClean="0"/>
               <a:pPr/>
-              <a:t>17.12.2019</a:t>
+              <a:t>01.01.2020</a:t>
             </a:fld>
             <a:endParaRPr lang="pl-PL"/>
           </a:p>
@@ -1050,7 +1053,7 @@
             <a:fld id="{DCD29016-2B0D-4C24-8AC7-581B9D6E3573}" type="datetimeFigureOut">
               <a:rPr lang="pl-PL" smtClean="0"/>
               <a:pPr/>
-              <a:t>17.12.2019</a:t>
+              <a:t>01.01.2020</a:t>
             </a:fld>
             <a:endParaRPr lang="pl-PL"/>
           </a:p>
@@ -1332,7 +1335,7 @@
             <a:fld id="{DCD29016-2B0D-4C24-8AC7-581B9D6E3573}" type="datetimeFigureOut">
               <a:rPr lang="pl-PL" smtClean="0"/>
               <a:pPr/>
-              <a:t>17.12.2019</a:t>
+              <a:t>01.01.2020</a:t>
             </a:fld>
             <a:endParaRPr lang="pl-PL"/>
           </a:p>
@@ -1748,7 +1751,7 @@
             <a:fld id="{DCD29016-2B0D-4C24-8AC7-581B9D6E3573}" type="datetimeFigureOut">
               <a:rPr lang="pl-PL" smtClean="0"/>
               <a:pPr/>
-              <a:t>17.12.2019</a:t>
+              <a:t>01.01.2020</a:t>
             </a:fld>
             <a:endParaRPr lang="pl-PL"/>
           </a:p>
@@ -1862,7 +1865,7 @@
             <a:fld id="{DCD29016-2B0D-4C24-8AC7-581B9D6E3573}" type="datetimeFigureOut">
               <a:rPr lang="pl-PL" smtClean="0"/>
               <a:pPr/>
-              <a:t>17.12.2019</a:t>
+              <a:t>01.01.2020</a:t>
             </a:fld>
             <a:endParaRPr lang="pl-PL"/>
           </a:p>
@@ -1954,7 +1957,7 @@
             <a:fld id="{DCD29016-2B0D-4C24-8AC7-581B9D6E3573}" type="datetimeFigureOut">
               <a:rPr lang="pl-PL" smtClean="0"/>
               <a:pPr/>
-              <a:t>17.12.2019</a:t>
+              <a:t>01.01.2020</a:t>
             </a:fld>
             <a:endParaRPr lang="pl-PL"/>
           </a:p>
@@ -2226,7 +2229,7 @@
             <a:fld id="{DCD29016-2B0D-4C24-8AC7-581B9D6E3573}" type="datetimeFigureOut">
               <a:rPr lang="pl-PL" smtClean="0"/>
               <a:pPr/>
-              <a:t>17.12.2019</a:t>
+              <a:t>01.01.2020</a:t>
             </a:fld>
             <a:endParaRPr lang="pl-PL"/>
           </a:p>
@@ -2475,7 +2478,7 @@
             <a:fld id="{DCD29016-2B0D-4C24-8AC7-581B9D6E3573}" type="datetimeFigureOut">
               <a:rPr lang="pl-PL" smtClean="0"/>
               <a:pPr/>
-              <a:t>17.12.2019</a:t>
+              <a:t>01.01.2020</a:t>
             </a:fld>
             <a:endParaRPr lang="pl-PL"/>
           </a:p>
@@ -2688,7 +2691,7 @@
             <a:fld id="{DCD29016-2B0D-4C24-8AC7-581B9D6E3573}" type="datetimeFigureOut">
               <a:rPr lang="pl-PL" smtClean="0"/>
               <a:pPr/>
-              <a:t>17.12.2019</a:t>
+              <a:t>01.01.2020</a:t>
             </a:fld>
             <a:endParaRPr lang="pl-PL"/>
           </a:p>
@@ -3163,6 +3166,883 @@
 </p:sld>
 </file>
 
+<file path=ppt/slides/slide2.xml><?xml version="1.0" encoding="utf-8"?>
+<p:sld xmlns:a="http://schemas.openxmlformats.org/drawingml/2006/main" xmlns:r="http://schemas.openxmlformats.org/officeDocument/2006/relationships" xmlns:p="http://schemas.openxmlformats.org/presentationml/2006/main">
+  <p:cSld>
+    <p:spTree>
+      <p:nvGrpSpPr>
+        <p:cNvPr id="1" name=""/>
+        <p:cNvGrpSpPr/>
+        <p:nvPr/>
+      </p:nvGrpSpPr>
+      <p:grpSpPr>
+        <a:xfrm>
+          <a:off x="0" y="0"/>
+          <a:ext cx="0" cy="0"/>
+          <a:chOff x="0" y="0"/>
+          <a:chExt cx="0" cy="0"/>
+        </a:xfrm>
+      </p:grpSpPr>
+      <p:grpSp>
+        <p:nvGrpSpPr>
+          <p:cNvPr id="7" name="Grupa 6"/>
+          <p:cNvGrpSpPr/>
+          <p:nvPr/>
+        </p:nvGrpSpPr>
+        <p:grpSpPr>
+          <a:xfrm>
+            <a:off x="1874947" y="3000429"/>
+            <a:ext cx="5394106" cy="857143"/>
+            <a:chOff x="2636374" y="3024670"/>
+            <a:chExt cx="5394106" cy="857143"/>
+          </a:xfrm>
+        </p:grpSpPr>
+        <p:pic>
+          <p:nvPicPr>
+            <p:cNvPr id="4" name="Obraz 3" descr="Logo.png"/>
+            <p:cNvPicPr>
+              <a:picLocks noChangeAspect="1"/>
+            </p:cNvPicPr>
+            <p:nvPr/>
+          </p:nvPicPr>
+          <p:blipFill>
+            <a:blip r:embed="rId2" cstate="print"/>
+            <a:stretch>
+              <a:fillRect/>
+            </a:stretch>
+          </p:blipFill>
+          <p:spPr>
+            <a:xfrm>
+              <a:off x="2636374" y="3024670"/>
+              <a:ext cx="857143" cy="857143"/>
+            </a:xfrm>
+            <a:prstGeom prst="rect">
+              <a:avLst/>
+            </a:prstGeom>
+          </p:spPr>
+        </p:pic>
+        <p:sp>
+          <p:nvSpPr>
+            <p:cNvPr id="5" name="pole tekstowe 4"/>
+            <p:cNvSpPr txBox="1"/>
+            <p:nvPr/>
+          </p:nvSpPr>
+          <p:spPr>
+            <a:xfrm>
+              <a:off x="3569002" y="3053132"/>
+              <a:ext cx="4461478" cy="800219"/>
+            </a:xfrm>
+            <a:prstGeom prst="rect">
+              <a:avLst/>
+            </a:prstGeom>
+            <a:noFill/>
+          </p:spPr>
+          <p:txBody>
+            <a:bodyPr wrap="none" rtlCol="0">
+              <a:spAutoFit/>
+            </a:bodyPr>
+            <a:lstStyle/>
+            <a:p>
+              <a:r>
+                <a:rPr lang="en-US" sz="2800" dirty="0">
+                  <a:latin typeface="Georgia Pro Semibold" pitchFamily="18" charset="0"/>
+                </a:rPr>
+                <a:t>Object-Oriented Internet</a:t>
+              </a:r>
+              <a:endParaRPr lang="pl-PL" sz="2800" dirty="0">
+                <a:latin typeface="Georgia Pro Semibold" pitchFamily="18" charset="0"/>
+              </a:endParaRPr>
+            </a:p>
+            <a:p>
+              <a:r>
+                <a:rPr lang="pl-PL" dirty="0">
+                  <a:latin typeface="Georgia Pro Semibold" pitchFamily="18" charset="0"/>
+                </a:rPr>
+                <a:t>OPC UA, DOA, M2M, </a:t>
+              </a:r>
+              <a:r>
+                <a:rPr lang="pl-PL" dirty="0" err="1">
+                  <a:latin typeface="Georgia Pro Semibold" pitchFamily="18" charset="0"/>
+                </a:rPr>
+                <a:t>IoT</a:t>
+              </a:r>
+              <a:r>
+                <a:rPr lang="pl-PL" dirty="0">
+                  <a:latin typeface="Georgia Pro Semibold" pitchFamily="18" charset="0"/>
+                </a:rPr>
+                <a:t>, I40</a:t>
+              </a:r>
+              <a:endParaRPr lang="en-US" dirty="0">
+                <a:latin typeface="Georgia Pro Semibold" pitchFamily="18" charset="0"/>
+              </a:endParaRPr>
+            </a:p>
+          </p:txBody>
+        </p:sp>
+      </p:grpSp>
+      <p:sp>
+        <p:nvSpPr>
+          <p:cNvPr id="2" name="Oval 1">
+            <a:extLst>
+              <a:ext uri="{FF2B5EF4-FFF2-40B4-BE49-F238E27FC236}">
+                <a16:creationId xmlns:a16="http://schemas.microsoft.com/office/drawing/2014/main" id="{CC93748C-58F6-4640-904F-3E5F5E9E287F}"/>
+              </a:ext>
+            </a:extLst>
+          </p:cNvPr>
+          <p:cNvSpPr/>
+          <p:nvPr/>
+        </p:nvSpPr>
+        <p:spPr>
+          <a:xfrm>
+            <a:off x="2699792" y="3933056"/>
+            <a:ext cx="255734" cy="288032"/>
+          </a:xfrm>
+          <a:prstGeom prst="ellipse">
+            <a:avLst/>
+          </a:prstGeom>
+          <a:solidFill>
+            <a:srgbClr val="70DB76"/>
+          </a:solidFill>
+          <a:ln>
+            <a:noFill/>
+          </a:ln>
+        </p:spPr>
+        <p:style>
+          <a:lnRef idx="2">
+            <a:schemeClr val="accent1">
+              <a:shade val="50000"/>
+            </a:schemeClr>
+          </a:lnRef>
+          <a:fillRef idx="1">
+            <a:schemeClr val="accent1"/>
+          </a:fillRef>
+          <a:effectRef idx="0">
+            <a:schemeClr val="accent1"/>
+          </a:effectRef>
+          <a:fontRef idx="minor">
+            <a:schemeClr val="lt1"/>
+          </a:fontRef>
+        </p:style>
+        <p:txBody>
+          <a:bodyPr rtlCol="0" anchor="ctr"/>
+          <a:lstStyle/>
+          <a:p>
+            <a:pPr algn="ctr"/>
+            <a:endParaRPr lang="pl-PL"/>
+          </a:p>
+        </p:txBody>
+      </p:sp>
+      <p:cxnSp>
+        <p:nvCxnSpPr>
+          <p:cNvPr id="6" name="Straight Connector 5">
+            <a:extLst>
+              <a:ext uri="{FF2B5EF4-FFF2-40B4-BE49-F238E27FC236}">
+                <a16:creationId xmlns:a16="http://schemas.microsoft.com/office/drawing/2014/main" id="{B383380F-7DCD-4B2A-992C-137A10A0B850}"/>
+              </a:ext>
+            </a:extLst>
+          </p:cNvPr>
+          <p:cNvCxnSpPr>
+            <a:endCxn id="2" idx="0"/>
+          </p:cNvCxnSpPr>
+          <p:nvPr/>
+        </p:nvCxnSpPr>
+        <p:spPr>
+          <a:xfrm>
+            <a:off x="2451470" y="3501008"/>
+            <a:ext cx="376189" cy="432048"/>
+          </a:xfrm>
+          <a:prstGeom prst="line">
+            <a:avLst/>
+          </a:prstGeom>
+          <a:ln>
+            <a:solidFill>
+              <a:srgbClr val="70DB76"/>
+            </a:solidFill>
+          </a:ln>
+        </p:spPr>
+        <p:style>
+          <a:lnRef idx="1">
+            <a:schemeClr val="accent1"/>
+          </a:lnRef>
+          <a:fillRef idx="0">
+            <a:schemeClr val="accent1"/>
+          </a:fillRef>
+          <a:effectRef idx="0">
+            <a:schemeClr val="accent1"/>
+          </a:effectRef>
+          <a:fontRef idx="minor">
+            <a:schemeClr val="tx1"/>
+          </a:fontRef>
+        </p:style>
+      </p:cxnSp>
+      <p:sp>
+        <p:nvSpPr>
+          <p:cNvPr id="8" name="TextBox 7">
+            <a:extLst>
+              <a:ext uri="{FF2B5EF4-FFF2-40B4-BE49-F238E27FC236}">
+                <a16:creationId xmlns:a16="http://schemas.microsoft.com/office/drawing/2014/main" id="{9BF17666-57E6-4882-85AB-A7DBEA5EF928}"/>
+              </a:ext>
+            </a:extLst>
+          </p:cNvPr>
+          <p:cNvSpPr txBox="1"/>
+          <p:nvPr/>
+        </p:nvSpPr>
+        <p:spPr>
+          <a:xfrm>
+            <a:off x="2958099" y="3903168"/>
+            <a:ext cx="3962944" cy="400110"/>
+          </a:xfrm>
+          <a:prstGeom prst="rect">
+            <a:avLst/>
+          </a:prstGeom>
+          <a:noFill/>
+        </p:spPr>
+        <p:txBody>
+          <a:bodyPr wrap="none" rtlCol="0">
+            <a:spAutoFit/>
+          </a:bodyPr>
+          <a:lstStyle/>
+          <a:p>
+            <a:r>
+              <a:rPr lang="en-US" sz="2000" dirty="0">
+                <a:latin typeface="Georgia Pro Semibold" panose="02040702050405020303" pitchFamily="18" charset="0"/>
+              </a:rPr>
+              <a:t>Address Space Model Designer</a:t>
+            </a:r>
+          </a:p>
+        </p:txBody>
+      </p:sp>
+      <p:pic>
+        <p:nvPicPr>
+          <p:cNvPr id="9" name="Picture 8" descr="A picture containing food, game&#10;&#10;Description automatically generated">
+            <a:extLst>
+              <a:ext uri="{FF2B5EF4-FFF2-40B4-BE49-F238E27FC236}">
+                <a16:creationId xmlns:a16="http://schemas.microsoft.com/office/drawing/2014/main" id="{AA627B37-38DF-484D-A2CB-AE31F269CF93}"/>
+              </a:ext>
+            </a:extLst>
+          </p:cNvPr>
+          <p:cNvPicPr>
+            <a:picLocks noChangeAspect="1"/>
+          </p:cNvPicPr>
+          <p:nvPr/>
+        </p:nvPicPr>
+        <p:blipFill>
+          <a:blip r:embed="rId3">
+            <a:extLst>
+              <a:ext uri="{28A0092B-C50C-407E-A947-70E740481C1C}">
+                <a14:useLocalDpi xmlns:a14="http://schemas.microsoft.com/office/drawing/2010/main" val="0"/>
+              </a:ext>
+            </a:extLst>
+          </a:blip>
+          <a:stretch>
+            <a:fillRect/>
+          </a:stretch>
+        </p:blipFill>
+        <p:spPr>
+          <a:xfrm>
+            <a:off x="6889052" y="3585823"/>
+            <a:ext cx="563268" cy="635265"/>
+          </a:xfrm>
+          <a:prstGeom prst="rect">
+            <a:avLst/>
+          </a:prstGeom>
+        </p:spPr>
+      </p:pic>
+    </p:spTree>
+  </p:cSld>
+  <p:clrMapOvr>
+    <a:masterClrMapping/>
+  </p:clrMapOvr>
+</p:sld>
+</file>
+
+<file path=ppt/slides/slide3.xml><?xml version="1.0" encoding="utf-8"?>
+<p:sld xmlns:a="http://schemas.openxmlformats.org/drawingml/2006/main" xmlns:r="http://schemas.openxmlformats.org/officeDocument/2006/relationships" xmlns:p="http://schemas.openxmlformats.org/presentationml/2006/main">
+  <p:cSld>
+    <p:spTree>
+      <p:nvGrpSpPr>
+        <p:cNvPr id="1" name=""/>
+        <p:cNvGrpSpPr/>
+        <p:nvPr/>
+      </p:nvGrpSpPr>
+      <p:grpSpPr>
+        <a:xfrm>
+          <a:off x="0" y="0"/>
+          <a:ext cx="0" cy="0"/>
+          <a:chOff x="0" y="0"/>
+          <a:chExt cx="0" cy="0"/>
+        </a:xfrm>
+      </p:grpSpPr>
+      <p:grpSp>
+        <p:nvGrpSpPr>
+          <p:cNvPr id="7" name="Grupa 6"/>
+          <p:cNvGrpSpPr/>
+          <p:nvPr/>
+        </p:nvGrpSpPr>
+        <p:grpSpPr>
+          <a:xfrm>
+            <a:off x="1874947" y="3000429"/>
+            <a:ext cx="5394106" cy="857143"/>
+            <a:chOff x="2636374" y="3024670"/>
+            <a:chExt cx="5394106" cy="857143"/>
+          </a:xfrm>
+        </p:grpSpPr>
+        <p:pic>
+          <p:nvPicPr>
+            <p:cNvPr id="4" name="Obraz 3" descr="Logo.png"/>
+            <p:cNvPicPr>
+              <a:picLocks noChangeAspect="1"/>
+            </p:cNvPicPr>
+            <p:nvPr/>
+          </p:nvPicPr>
+          <p:blipFill>
+            <a:blip r:embed="rId2" cstate="print"/>
+            <a:stretch>
+              <a:fillRect/>
+            </a:stretch>
+          </p:blipFill>
+          <p:spPr>
+            <a:xfrm>
+              <a:off x="2636374" y="3024670"/>
+              <a:ext cx="857143" cy="857143"/>
+            </a:xfrm>
+            <a:prstGeom prst="rect">
+              <a:avLst/>
+            </a:prstGeom>
+          </p:spPr>
+        </p:pic>
+        <p:sp>
+          <p:nvSpPr>
+            <p:cNvPr id="5" name="pole tekstowe 4"/>
+            <p:cNvSpPr txBox="1"/>
+            <p:nvPr/>
+          </p:nvSpPr>
+          <p:spPr>
+            <a:xfrm>
+              <a:off x="3569002" y="3053132"/>
+              <a:ext cx="4461478" cy="800219"/>
+            </a:xfrm>
+            <a:prstGeom prst="rect">
+              <a:avLst/>
+            </a:prstGeom>
+            <a:noFill/>
+          </p:spPr>
+          <p:txBody>
+            <a:bodyPr wrap="none" rtlCol="0">
+              <a:spAutoFit/>
+            </a:bodyPr>
+            <a:lstStyle/>
+            <a:p>
+              <a:r>
+                <a:rPr lang="en-US" sz="2800" dirty="0">
+                  <a:latin typeface="Georgia Pro Semibold" pitchFamily="18" charset="0"/>
+                </a:rPr>
+                <a:t>Object-Oriented Internet</a:t>
+              </a:r>
+              <a:endParaRPr lang="pl-PL" sz="2800" dirty="0">
+                <a:latin typeface="Georgia Pro Semibold" pitchFamily="18" charset="0"/>
+              </a:endParaRPr>
+            </a:p>
+            <a:p>
+              <a:r>
+                <a:rPr lang="pl-PL" dirty="0">
+                  <a:latin typeface="Georgia Pro Semibold" pitchFamily="18" charset="0"/>
+                </a:rPr>
+                <a:t>OPC UA, DOA, M2M, </a:t>
+              </a:r>
+              <a:r>
+                <a:rPr lang="pl-PL" dirty="0" err="1">
+                  <a:latin typeface="Georgia Pro Semibold" pitchFamily="18" charset="0"/>
+                </a:rPr>
+                <a:t>IoT</a:t>
+              </a:r>
+              <a:r>
+                <a:rPr lang="pl-PL" dirty="0">
+                  <a:latin typeface="Georgia Pro Semibold" pitchFamily="18" charset="0"/>
+                </a:rPr>
+                <a:t>, I40</a:t>
+              </a:r>
+              <a:endParaRPr lang="en-US" dirty="0">
+                <a:latin typeface="Georgia Pro Semibold" pitchFamily="18" charset="0"/>
+              </a:endParaRPr>
+            </a:p>
+          </p:txBody>
+        </p:sp>
+      </p:grpSp>
+      <p:sp>
+        <p:nvSpPr>
+          <p:cNvPr id="2" name="Oval 1">
+            <a:extLst>
+              <a:ext uri="{FF2B5EF4-FFF2-40B4-BE49-F238E27FC236}">
+                <a16:creationId xmlns:a16="http://schemas.microsoft.com/office/drawing/2014/main" id="{CC93748C-58F6-4640-904F-3E5F5E9E287F}"/>
+              </a:ext>
+            </a:extLst>
+          </p:cNvPr>
+          <p:cNvSpPr/>
+          <p:nvPr/>
+        </p:nvSpPr>
+        <p:spPr>
+          <a:xfrm>
+            <a:off x="2699792" y="3933056"/>
+            <a:ext cx="255734" cy="288032"/>
+          </a:xfrm>
+          <a:prstGeom prst="ellipse">
+            <a:avLst/>
+          </a:prstGeom>
+          <a:solidFill>
+            <a:srgbClr val="70DB76"/>
+          </a:solidFill>
+          <a:ln>
+            <a:noFill/>
+          </a:ln>
+        </p:spPr>
+        <p:style>
+          <a:lnRef idx="2">
+            <a:schemeClr val="accent1">
+              <a:shade val="50000"/>
+            </a:schemeClr>
+          </a:lnRef>
+          <a:fillRef idx="1">
+            <a:schemeClr val="accent1"/>
+          </a:fillRef>
+          <a:effectRef idx="0">
+            <a:schemeClr val="accent1"/>
+          </a:effectRef>
+          <a:fontRef idx="minor">
+            <a:schemeClr val="lt1"/>
+          </a:fontRef>
+        </p:style>
+        <p:txBody>
+          <a:bodyPr rtlCol="0" anchor="ctr"/>
+          <a:lstStyle/>
+          <a:p>
+            <a:pPr algn="ctr"/>
+            <a:endParaRPr lang="pl-PL"/>
+          </a:p>
+        </p:txBody>
+      </p:sp>
+      <p:cxnSp>
+        <p:nvCxnSpPr>
+          <p:cNvPr id="6" name="Straight Connector 5">
+            <a:extLst>
+              <a:ext uri="{FF2B5EF4-FFF2-40B4-BE49-F238E27FC236}">
+                <a16:creationId xmlns:a16="http://schemas.microsoft.com/office/drawing/2014/main" id="{B383380F-7DCD-4B2A-992C-137A10A0B850}"/>
+              </a:ext>
+            </a:extLst>
+          </p:cNvPr>
+          <p:cNvCxnSpPr>
+            <a:endCxn id="2" idx="0"/>
+          </p:cNvCxnSpPr>
+          <p:nvPr/>
+        </p:nvCxnSpPr>
+        <p:spPr>
+          <a:xfrm>
+            <a:off x="2451470" y="3501008"/>
+            <a:ext cx="376189" cy="432048"/>
+          </a:xfrm>
+          <a:prstGeom prst="line">
+            <a:avLst/>
+          </a:prstGeom>
+          <a:ln>
+            <a:solidFill>
+              <a:srgbClr val="70DB76"/>
+            </a:solidFill>
+          </a:ln>
+        </p:spPr>
+        <p:style>
+          <a:lnRef idx="1">
+            <a:schemeClr val="accent1"/>
+          </a:lnRef>
+          <a:fillRef idx="0">
+            <a:schemeClr val="accent1"/>
+          </a:fillRef>
+          <a:effectRef idx="0">
+            <a:schemeClr val="accent1"/>
+          </a:effectRef>
+          <a:fontRef idx="minor">
+            <a:schemeClr val="tx1"/>
+          </a:fontRef>
+        </p:style>
+      </p:cxnSp>
+      <p:sp>
+        <p:nvSpPr>
+          <p:cNvPr id="8" name="TextBox 7">
+            <a:extLst>
+              <a:ext uri="{FF2B5EF4-FFF2-40B4-BE49-F238E27FC236}">
+                <a16:creationId xmlns:a16="http://schemas.microsoft.com/office/drawing/2014/main" id="{9BF17666-57E6-4882-85AB-A7DBEA5EF928}"/>
+              </a:ext>
+            </a:extLst>
+          </p:cNvPr>
+          <p:cNvSpPr txBox="1"/>
+          <p:nvPr/>
+        </p:nvSpPr>
+        <p:spPr>
+          <a:xfrm>
+            <a:off x="2999719" y="3903455"/>
+            <a:ext cx="2310248" cy="400110"/>
+          </a:xfrm>
+          <a:prstGeom prst="rect">
+            <a:avLst/>
+          </a:prstGeom>
+          <a:noFill/>
+        </p:spPr>
+        <p:txBody>
+          <a:bodyPr wrap="none" rtlCol="0">
+            <a:spAutoFit/>
+          </a:bodyPr>
+          <a:lstStyle/>
+          <a:p>
+            <a:r>
+              <a:rPr lang="en-US" sz="2000">
+                <a:latin typeface="Georgia Pro Semibold" panose="02040702050405020303" pitchFamily="18" charset="0"/>
+              </a:rPr>
+              <a:t>Process Observer</a:t>
+            </a:r>
+          </a:p>
+        </p:txBody>
+      </p:sp>
+      <p:pic>
+        <p:nvPicPr>
+          <p:cNvPr id="14" name="Picture 13">
+            <a:extLst>
+              <a:ext uri="{FF2B5EF4-FFF2-40B4-BE49-F238E27FC236}">
+                <a16:creationId xmlns:a16="http://schemas.microsoft.com/office/drawing/2014/main" id="{4D2ED720-B08D-4EB8-AA24-1E96FAE93E60}"/>
+              </a:ext>
+            </a:extLst>
+          </p:cNvPr>
+          <p:cNvPicPr>
+            <a:picLocks noChangeAspect="1"/>
+          </p:cNvPicPr>
+          <p:nvPr/>
+        </p:nvPicPr>
+        <p:blipFill>
+          <a:blip r:embed="rId3">
+            <a:extLst>
+              <a:ext uri="{28A0092B-C50C-407E-A947-70E740481C1C}">
+                <a14:useLocalDpi xmlns:a14="http://schemas.microsoft.com/office/drawing/2010/main" val="0"/>
+              </a:ext>
+            </a:extLst>
+          </a:blip>
+          <a:stretch>
+            <a:fillRect/>
+          </a:stretch>
+        </p:blipFill>
+        <p:spPr>
+          <a:xfrm>
+            <a:off x="6127352" y="3755580"/>
+            <a:ext cx="1180952" cy="609524"/>
+          </a:xfrm>
+          <a:prstGeom prst="rect">
+            <a:avLst/>
+          </a:prstGeom>
+        </p:spPr>
+      </p:pic>
+    </p:spTree>
+    <p:extLst>
+      <p:ext uri="{BB962C8B-B14F-4D97-AF65-F5344CB8AC3E}">
+        <p14:creationId xmlns:p14="http://schemas.microsoft.com/office/powerpoint/2010/main" val="1196802122"/>
+      </p:ext>
+    </p:extLst>
+  </p:cSld>
+  <p:clrMapOvr>
+    <a:masterClrMapping/>
+  </p:clrMapOvr>
+</p:sld>
+</file>
+
+<file path=ppt/slides/slide4.xml><?xml version="1.0" encoding="utf-8"?>
+<p:sld xmlns:a="http://schemas.openxmlformats.org/drawingml/2006/main" xmlns:r="http://schemas.openxmlformats.org/officeDocument/2006/relationships" xmlns:p="http://schemas.openxmlformats.org/presentationml/2006/main">
+  <p:cSld>
+    <p:spTree>
+      <p:nvGrpSpPr>
+        <p:cNvPr id="1" name=""/>
+        <p:cNvGrpSpPr/>
+        <p:nvPr/>
+      </p:nvGrpSpPr>
+      <p:grpSpPr>
+        <a:xfrm>
+          <a:off x="0" y="0"/>
+          <a:ext cx="0" cy="0"/>
+          <a:chOff x="0" y="0"/>
+          <a:chExt cx="0" cy="0"/>
+        </a:xfrm>
+      </p:grpSpPr>
+      <p:grpSp>
+        <p:nvGrpSpPr>
+          <p:cNvPr id="7" name="Grupa 6"/>
+          <p:cNvGrpSpPr/>
+          <p:nvPr/>
+        </p:nvGrpSpPr>
+        <p:grpSpPr>
+          <a:xfrm>
+            <a:off x="1874947" y="3000429"/>
+            <a:ext cx="5394106" cy="857143"/>
+            <a:chOff x="2636374" y="3024670"/>
+            <a:chExt cx="5394106" cy="857143"/>
+          </a:xfrm>
+        </p:grpSpPr>
+        <p:pic>
+          <p:nvPicPr>
+            <p:cNvPr id="4" name="Obraz 3" descr="Logo.png"/>
+            <p:cNvPicPr>
+              <a:picLocks noChangeAspect="1"/>
+            </p:cNvPicPr>
+            <p:nvPr/>
+          </p:nvPicPr>
+          <p:blipFill>
+            <a:blip r:embed="rId2" cstate="print"/>
+            <a:stretch>
+              <a:fillRect/>
+            </a:stretch>
+          </p:blipFill>
+          <p:spPr>
+            <a:xfrm>
+              <a:off x="2636374" y="3024670"/>
+              <a:ext cx="857143" cy="857143"/>
+            </a:xfrm>
+            <a:prstGeom prst="rect">
+              <a:avLst/>
+            </a:prstGeom>
+          </p:spPr>
+        </p:pic>
+        <p:sp>
+          <p:nvSpPr>
+            <p:cNvPr id="5" name="pole tekstowe 4"/>
+            <p:cNvSpPr txBox="1"/>
+            <p:nvPr/>
+          </p:nvSpPr>
+          <p:spPr>
+            <a:xfrm>
+              <a:off x="3569002" y="3053132"/>
+              <a:ext cx="4461478" cy="800219"/>
+            </a:xfrm>
+            <a:prstGeom prst="rect">
+              <a:avLst/>
+            </a:prstGeom>
+            <a:noFill/>
+          </p:spPr>
+          <p:txBody>
+            <a:bodyPr wrap="none" rtlCol="0">
+              <a:spAutoFit/>
+            </a:bodyPr>
+            <a:lstStyle/>
+            <a:p>
+              <a:r>
+                <a:rPr lang="en-US" sz="2800" dirty="0">
+                  <a:latin typeface="Georgia Pro Semibold" pitchFamily="18" charset="0"/>
+                </a:rPr>
+                <a:t>Object-Oriented Internet</a:t>
+              </a:r>
+              <a:endParaRPr lang="pl-PL" sz="2800" dirty="0">
+                <a:latin typeface="Georgia Pro Semibold" pitchFamily="18" charset="0"/>
+              </a:endParaRPr>
+            </a:p>
+            <a:p>
+              <a:r>
+                <a:rPr lang="pl-PL" dirty="0">
+                  <a:latin typeface="Georgia Pro Semibold" pitchFamily="18" charset="0"/>
+                </a:rPr>
+                <a:t>OPC UA, DOA, M2M, </a:t>
+              </a:r>
+              <a:r>
+                <a:rPr lang="pl-PL" dirty="0" err="1">
+                  <a:latin typeface="Georgia Pro Semibold" pitchFamily="18" charset="0"/>
+                </a:rPr>
+                <a:t>IoT</a:t>
+              </a:r>
+              <a:r>
+                <a:rPr lang="pl-PL" dirty="0">
+                  <a:latin typeface="Georgia Pro Semibold" pitchFamily="18" charset="0"/>
+                </a:rPr>
+                <a:t>, I40</a:t>
+              </a:r>
+              <a:endParaRPr lang="en-US" dirty="0">
+                <a:latin typeface="Georgia Pro Semibold" pitchFamily="18" charset="0"/>
+              </a:endParaRPr>
+            </a:p>
+          </p:txBody>
+        </p:sp>
+      </p:grpSp>
+      <p:sp>
+        <p:nvSpPr>
+          <p:cNvPr id="2" name="Oval 1">
+            <a:extLst>
+              <a:ext uri="{FF2B5EF4-FFF2-40B4-BE49-F238E27FC236}">
+                <a16:creationId xmlns:a16="http://schemas.microsoft.com/office/drawing/2014/main" id="{CC93748C-58F6-4640-904F-3E5F5E9E287F}"/>
+              </a:ext>
+            </a:extLst>
+          </p:cNvPr>
+          <p:cNvSpPr/>
+          <p:nvPr/>
+        </p:nvSpPr>
+        <p:spPr>
+          <a:xfrm>
+            <a:off x="2699792" y="3933056"/>
+            <a:ext cx="255734" cy="288032"/>
+          </a:xfrm>
+          <a:prstGeom prst="ellipse">
+            <a:avLst/>
+          </a:prstGeom>
+          <a:solidFill>
+            <a:srgbClr val="70DB76"/>
+          </a:solidFill>
+          <a:ln>
+            <a:noFill/>
+          </a:ln>
+        </p:spPr>
+        <p:style>
+          <a:lnRef idx="2">
+            <a:schemeClr val="accent1">
+              <a:shade val="50000"/>
+            </a:schemeClr>
+          </a:lnRef>
+          <a:fillRef idx="1">
+            <a:schemeClr val="accent1"/>
+          </a:fillRef>
+          <a:effectRef idx="0">
+            <a:schemeClr val="accent1"/>
+          </a:effectRef>
+          <a:fontRef idx="minor">
+            <a:schemeClr val="lt1"/>
+          </a:fontRef>
+        </p:style>
+        <p:txBody>
+          <a:bodyPr rtlCol="0" anchor="ctr"/>
+          <a:lstStyle/>
+          <a:p>
+            <a:pPr algn="ctr"/>
+            <a:endParaRPr lang="pl-PL"/>
+          </a:p>
+        </p:txBody>
+      </p:sp>
+      <p:cxnSp>
+        <p:nvCxnSpPr>
+          <p:cNvPr id="6" name="Straight Connector 5">
+            <a:extLst>
+              <a:ext uri="{FF2B5EF4-FFF2-40B4-BE49-F238E27FC236}">
+                <a16:creationId xmlns:a16="http://schemas.microsoft.com/office/drawing/2014/main" id="{B383380F-7DCD-4B2A-992C-137A10A0B850}"/>
+              </a:ext>
+            </a:extLst>
+          </p:cNvPr>
+          <p:cNvCxnSpPr>
+            <a:endCxn id="2" idx="0"/>
+          </p:cNvCxnSpPr>
+          <p:nvPr/>
+        </p:nvCxnSpPr>
+        <p:spPr>
+          <a:xfrm>
+            <a:off x="2451470" y="3501008"/>
+            <a:ext cx="376189" cy="432048"/>
+          </a:xfrm>
+          <a:prstGeom prst="line">
+            <a:avLst/>
+          </a:prstGeom>
+          <a:ln>
+            <a:solidFill>
+              <a:srgbClr val="70DB76"/>
+            </a:solidFill>
+          </a:ln>
+        </p:spPr>
+        <p:style>
+          <a:lnRef idx="1">
+            <a:schemeClr val="accent1"/>
+          </a:lnRef>
+          <a:fillRef idx="0">
+            <a:schemeClr val="accent1"/>
+          </a:fillRef>
+          <a:effectRef idx="0">
+            <a:schemeClr val="accent1"/>
+          </a:effectRef>
+          <a:fontRef idx="minor">
+            <a:schemeClr val="tx1"/>
+          </a:fontRef>
+        </p:style>
+      </p:cxnSp>
+      <p:sp>
+        <p:nvSpPr>
+          <p:cNvPr id="8" name="TextBox 7">
+            <a:extLst>
+              <a:ext uri="{FF2B5EF4-FFF2-40B4-BE49-F238E27FC236}">
+                <a16:creationId xmlns:a16="http://schemas.microsoft.com/office/drawing/2014/main" id="{9BF17666-57E6-4882-85AB-A7DBEA5EF928}"/>
+              </a:ext>
+            </a:extLst>
+          </p:cNvPr>
+          <p:cNvSpPr txBox="1"/>
+          <p:nvPr/>
+        </p:nvSpPr>
+        <p:spPr>
+          <a:xfrm>
+            <a:off x="2999719" y="3903455"/>
+            <a:ext cx="2321469" cy="400110"/>
+          </a:xfrm>
+          <a:prstGeom prst="rect">
+            <a:avLst/>
+          </a:prstGeom>
+          <a:noFill/>
+        </p:spPr>
+        <p:txBody>
+          <a:bodyPr wrap="none" rtlCol="0">
+            <a:spAutoFit/>
+          </a:bodyPr>
+          <a:lstStyle/>
+          <a:p>
+            <a:r>
+              <a:rPr lang="en-US" sz="2000" dirty="0">
+                <a:latin typeface="Georgia Pro Semibold" panose="02040702050405020303" pitchFamily="18" charset="0"/>
+              </a:rPr>
+              <a:t>&lt;Product Name&gt;</a:t>
+            </a:r>
+          </a:p>
+        </p:txBody>
+      </p:sp>
+      <p:pic>
+        <p:nvPicPr>
+          <p:cNvPr id="10" name="Picture 9" descr="A picture containing clock, object&#10;&#10;Description automatically generated">
+            <a:extLst>
+              <a:ext uri="{FF2B5EF4-FFF2-40B4-BE49-F238E27FC236}">
+                <a16:creationId xmlns:a16="http://schemas.microsoft.com/office/drawing/2014/main" id="{02C288A7-427C-4584-8EEA-18BAB408CF9B}"/>
+              </a:ext>
+            </a:extLst>
+          </p:cNvPr>
+          <p:cNvPicPr>
+            <a:picLocks noChangeAspect="1"/>
+          </p:cNvPicPr>
+          <p:nvPr/>
+        </p:nvPicPr>
+        <p:blipFill>
+          <a:blip r:embed="rId3">
+            <a:extLst>
+              <a:ext uri="{28A0092B-C50C-407E-A947-70E740481C1C}">
+                <a14:useLocalDpi xmlns:a14="http://schemas.microsoft.com/office/drawing/2010/main" val="0"/>
+              </a:ext>
+            </a:extLst>
+          </a:blip>
+          <a:stretch>
+            <a:fillRect/>
+          </a:stretch>
+        </p:blipFill>
+        <p:spPr>
+          <a:xfrm>
+            <a:off x="6659529" y="3694041"/>
+            <a:ext cx="609524" cy="609524"/>
+          </a:xfrm>
+          <a:prstGeom prst="rect">
+            <a:avLst/>
+          </a:prstGeom>
+        </p:spPr>
+      </p:pic>
+    </p:spTree>
+    <p:extLst>
+      <p:ext uri="{BB962C8B-B14F-4D97-AF65-F5344CB8AC3E}">
+        <p14:creationId xmlns:p14="http://schemas.microsoft.com/office/powerpoint/2010/main" val="998032549"/>
+      </p:ext>
+    </p:extLst>
+  </p:cSld>
+  <p:clrMapOvr>
+    <a:masterClrMapping/>
+  </p:clrMapOvr>
+</p:sld>
+</file>
+
 <file path=ppt/theme/theme1.xml><?xml version="1.0" encoding="utf-8"?>
 <a:theme xmlns:a="http://schemas.openxmlformats.org/drawingml/2006/main" name="Motyw pakietu Office">
   <a:themeElements>

</xml_diff>

<commit_message>
Updated graphics in the .pptx for OPCUACommon
</commit_message>
<xml_diff>
--- a/CommonResources/Media/Figures.pptx
+++ b/CommonResources/Media/Figures.pptx
@@ -9,6 +9,7 @@
     <p:sldId id="257" r:id="rId3"/>
     <p:sldId id="258" r:id="rId4"/>
     <p:sldId id="259" r:id="rId5"/>
+    <p:sldId id="260" r:id="rId6"/>
   </p:sldIdLst>
   <p:sldSz cx="9144000" cy="6858000" type="screen4x3"/>
   <p:notesSz cx="6858000" cy="9144000"/>
@@ -306,7 +307,7 @@
             <a:fld id="{DCD29016-2B0D-4C24-8AC7-581B9D6E3573}" type="datetimeFigureOut">
               <a:rPr lang="pl-PL" smtClean="0"/>
               <a:pPr/>
-              <a:t>01.01.2020</a:t>
+              <a:t>15.08.2021</a:t>
             </a:fld>
             <a:endParaRPr lang="pl-PL"/>
           </a:p>
@@ -471,7 +472,7 @@
             <a:fld id="{DCD29016-2B0D-4C24-8AC7-581B9D6E3573}" type="datetimeFigureOut">
               <a:rPr lang="pl-PL" smtClean="0"/>
               <a:pPr/>
-              <a:t>01.01.2020</a:t>
+              <a:t>15.08.2021</a:t>
             </a:fld>
             <a:endParaRPr lang="pl-PL"/>
           </a:p>
@@ -646,7 +647,7 @@
             <a:fld id="{DCD29016-2B0D-4C24-8AC7-581B9D6E3573}" type="datetimeFigureOut">
               <a:rPr lang="pl-PL" smtClean="0"/>
               <a:pPr/>
-              <a:t>01.01.2020</a:t>
+              <a:t>15.08.2021</a:t>
             </a:fld>
             <a:endParaRPr lang="pl-PL"/>
           </a:p>
@@ -811,7 +812,7 @@
             <a:fld id="{DCD29016-2B0D-4C24-8AC7-581B9D6E3573}" type="datetimeFigureOut">
               <a:rPr lang="pl-PL" smtClean="0"/>
               <a:pPr/>
-              <a:t>01.01.2020</a:t>
+              <a:t>15.08.2021</a:t>
             </a:fld>
             <a:endParaRPr lang="pl-PL"/>
           </a:p>
@@ -1053,7 +1054,7 @@
             <a:fld id="{DCD29016-2B0D-4C24-8AC7-581B9D6E3573}" type="datetimeFigureOut">
               <a:rPr lang="pl-PL" smtClean="0"/>
               <a:pPr/>
-              <a:t>01.01.2020</a:t>
+              <a:t>15.08.2021</a:t>
             </a:fld>
             <a:endParaRPr lang="pl-PL"/>
           </a:p>
@@ -1335,7 +1336,7 @@
             <a:fld id="{DCD29016-2B0D-4C24-8AC7-581B9D6E3573}" type="datetimeFigureOut">
               <a:rPr lang="pl-PL" smtClean="0"/>
               <a:pPr/>
-              <a:t>01.01.2020</a:t>
+              <a:t>15.08.2021</a:t>
             </a:fld>
             <a:endParaRPr lang="pl-PL"/>
           </a:p>
@@ -1751,7 +1752,7 @@
             <a:fld id="{DCD29016-2B0D-4C24-8AC7-581B9D6E3573}" type="datetimeFigureOut">
               <a:rPr lang="pl-PL" smtClean="0"/>
               <a:pPr/>
-              <a:t>01.01.2020</a:t>
+              <a:t>15.08.2021</a:t>
             </a:fld>
             <a:endParaRPr lang="pl-PL"/>
           </a:p>
@@ -1865,7 +1866,7 @@
             <a:fld id="{DCD29016-2B0D-4C24-8AC7-581B9D6E3573}" type="datetimeFigureOut">
               <a:rPr lang="pl-PL" smtClean="0"/>
               <a:pPr/>
-              <a:t>01.01.2020</a:t>
+              <a:t>15.08.2021</a:t>
             </a:fld>
             <a:endParaRPr lang="pl-PL"/>
           </a:p>
@@ -1957,7 +1958,7 @@
             <a:fld id="{DCD29016-2B0D-4C24-8AC7-581B9D6E3573}" type="datetimeFigureOut">
               <a:rPr lang="pl-PL" smtClean="0"/>
               <a:pPr/>
-              <a:t>01.01.2020</a:t>
+              <a:t>15.08.2021</a:t>
             </a:fld>
             <a:endParaRPr lang="pl-PL"/>
           </a:p>
@@ -2229,7 +2230,7 @@
             <a:fld id="{DCD29016-2B0D-4C24-8AC7-581B9D6E3573}" type="datetimeFigureOut">
               <a:rPr lang="pl-PL" smtClean="0"/>
               <a:pPr/>
-              <a:t>01.01.2020</a:t>
+              <a:t>15.08.2021</a:t>
             </a:fld>
             <a:endParaRPr lang="pl-PL"/>
           </a:p>
@@ -2478,7 +2479,7 @@
             <a:fld id="{DCD29016-2B0D-4C24-8AC7-581B9D6E3573}" type="datetimeFigureOut">
               <a:rPr lang="pl-PL" smtClean="0"/>
               <a:pPr/>
-              <a:t>01.01.2020</a:t>
+              <a:t>15.08.2021</a:t>
             </a:fld>
             <a:endParaRPr lang="pl-PL"/>
           </a:p>
@@ -2691,7 +2692,7 @@
             <a:fld id="{DCD29016-2B0D-4C24-8AC7-581B9D6E3573}" type="datetimeFigureOut">
               <a:rPr lang="pl-PL" smtClean="0"/>
               <a:pPr/>
-              <a:t>01.01.2020</a:t>
+              <a:t>15.08.2021</a:t>
             </a:fld>
             <a:endParaRPr lang="pl-PL"/>
           </a:p>
@@ -3064,42 +3065,24 @@
       </p:grpSpPr>
       <p:grpSp>
         <p:nvGrpSpPr>
-          <p:cNvPr id="7" name="Grupa 6"/>
+          <p:cNvPr id="6" name="Group 5">
+            <a:extLst>
+              <a:ext uri="{FF2B5EF4-FFF2-40B4-BE49-F238E27FC236}">
+                <a16:creationId xmlns:a16="http://schemas.microsoft.com/office/drawing/2014/main" id="{76BE0ADC-082F-44A6-AD71-912A59CEAC6A}"/>
+              </a:ext>
+            </a:extLst>
+          </p:cNvPr>
           <p:cNvGrpSpPr/>
           <p:nvPr/>
         </p:nvGrpSpPr>
         <p:grpSpPr>
           <a:xfrm>
-            <a:off x="1874947" y="3000429"/>
-            <a:ext cx="5394106" cy="857143"/>
-            <a:chOff x="2636374" y="3024670"/>
-            <a:chExt cx="5394106" cy="857143"/>
+            <a:off x="1938670" y="2990028"/>
+            <a:ext cx="5266661" cy="877944"/>
+            <a:chOff x="2002392" y="2470003"/>
+            <a:chExt cx="5266661" cy="877944"/>
           </a:xfrm>
         </p:grpSpPr>
-        <p:pic>
-          <p:nvPicPr>
-            <p:cNvPr id="4" name="Obraz 3" descr="Logo.png"/>
-            <p:cNvPicPr>
-              <a:picLocks noChangeAspect="1"/>
-            </p:cNvPicPr>
-            <p:nvPr/>
-          </p:nvPicPr>
-          <p:blipFill>
-            <a:blip r:embed="rId2" cstate="print"/>
-            <a:stretch>
-              <a:fillRect/>
-            </a:stretch>
-          </p:blipFill>
-          <p:spPr>
-            <a:xfrm>
-              <a:off x="2636374" y="3024670"/>
-              <a:ext cx="857143" cy="857143"/>
-            </a:xfrm>
-            <a:prstGeom prst="rect">
-              <a:avLst/>
-            </a:prstGeom>
-          </p:spPr>
-        </p:pic>
         <p:sp>
           <p:nvSpPr>
             <p:cNvPr id="5" name="pole tekstowe 4"/>
@@ -3108,7 +3091,7 @@
           </p:nvSpPr>
           <p:spPr>
             <a:xfrm>
-              <a:off x="3569002" y="3053132"/>
+              <a:off x="2807575" y="2508866"/>
               <a:ext cx="4461478" cy="800219"/>
             </a:xfrm>
             <a:prstGeom prst="rect">
@@ -3157,6 +3140,42 @@
             </a:p>
           </p:txBody>
         </p:sp>
+        <p:pic>
+          <p:nvPicPr>
+            <p:cNvPr id="3" name="Picture 2">
+              <a:extLst>
+                <a:ext uri="{FF2B5EF4-FFF2-40B4-BE49-F238E27FC236}">
+                  <a16:creationId xmlns:a16="http://schemas.microsoft.com/office/drawing/2014/main" id="{28B83DBE-E7EC-4931-B1D1-8E5DC1B58300}"/>
+                </a:ext>
+              </a:extLst>
+            </p:cNvPr>
+            <p:cNvPicPr>
+              <a:picLocks noChangeAspect="1"/>
+            </p:cNvPicPr>
+            <p:nvPr/>
+          </p:nvPicPr>
+          <p:blipFill>
+            <a:blip r:embed="rId2" cstate="print">
+              <a:extLst>
+                <a:ext uri="{28A0092B-C50C-407E-A947-70E740481C1C}">
+                  <a14:useLocalDpi xmlns:a14="http://schemas.microsoft.com/office/drawing/2010/main" val="0"/>
+                </a:ext>
+              </a:extLst>
+            </a:blip>
+            <a:stretch>
+              <a:fillRect/>
+            </a:stretch>
+          </p:blipFill>
+          <p:spPr>
+            <a:xfrm flipH="1">
+              <a:off x="2002392" y="2470003"/>
+              <a:ext cx="841416" cy="877944"/>
+            </a:xfrm>
+            <a:prstGeom prst="rect">
+              <a:avLst/>
+            </a:prstGeom>
+          </p:spPr>
+        </p:pic>
       </p:grpSp>
     </p:spTree>
   </p:cSld>
@@ -3766,102 +3785,36 @@
           <a:chExt cx="0" cy="0"/>
         </a:xfrm>
       </p:grpSpPr>
-      <p:grpSp>
-        <p:nvGrpSpPr>
-          <p:cNvPr id="7" name="Grupa 6"/>
-          <p:cNvGrpSpPr/>
+      <p:pic>
+        <p:nvPicPr>
+          <p:cNvPr id="3" name="Picture 2">
+            <a:extLst>
+              <a:ext uri="{FF2B5EF4-FFF2-40B4-BE49-F238E27FC236}">
+                <a16:creationId xmlns:a16="http://schemas.microsoft.com/office/drawing/2014/main" id="{F1AEECE1-2318-43F8-BC12-408E691B2BE5}"/>
+              </a:ext>
+            </a:extLst>
+          </p:cNvPr>
+          <p:cNvPicPr>
+            <a:picLocks noChangeAspect="1"/>
+          </p:cNvPicPr>
           <p:nvPr/>
-        </p:nvGrpSpPr>
-        <p:grpSpPr>
+        </p:nvPicPr>
+        <p:blipFill>
+          <a:blip r:embed="rId2"/>
+          <a:stretch>
+            <a:fillRect/>
+          </a:stretch>
+        </p:blipFill>
+        <p:spPr>
           <a:xfrm>
-            <a:off x="1874947" y="3000429"/>
-            <a:ext cx="5394106" cy="857143"/>
-            <a:chOff x="2636374" y="3024670"/>
-            <a:chExt cx="5394106" cy="857143"/>
+            <a:off x="1895624" y="2950422"/>
+            <a:ext cx="5352752" cy="957155"/>
           </a:xfrm>
-        </p:grpSpPr>
-        <p:pic>
-          <p:nvPicPr>
-            <p:cNvPr id="4" name="Obraz 3" descr="Logo.png"/>
-            <p:cNvPicPr>
-              <a:picLocks noChangeAspect="1"/>
-            </p:cNvPicPr>
-            <p:nvPr/>
-          </p:nvPicPr>
-          <p:blipFill>
-            <a:blip r:embed="rId2" cstate="print"/>
-            <a:stretch>
-              <a:fillRect/>
-            </a:stretch>
-          </p:blipFill>
-          <p:spPr>
-            <a:xfrm>
-              <a:off x="2636374" y="3024670"/>
-              <a:ext cx="857143" cy="857143"/>
-            </a:xfrm>
-            <a:prstGeom prst="rect">
-              <a:avLst/>
-            </a:prstGeom>
-          </p:spPr>
-        </p:pic>
-        <p:sp>
-          <p:nvSpPr>
-            <p:cNvPr id="5" name="pole tekstowe 4"/>
-            <p:cNvSpPr txBox="1"/>
-            <p:nvPr/>
-          </p:nvSpPr>
-          <p:spPr>
-            <a:xfrm>
-              <a:off x="3569002" y="3053132"/>
-              <a:ext cx="4461478" cy="800219"/>
-            </a:xfrm>
-            <a:prstGeom prst="rect">
-              <a:avLst/>
-            </a:prstGeom>
-            <a:noFill/>
-          </p:spPr>
-          <p:txBody>
-            <a:bodyPr wrap="none" rtlCol="0">
-              <a:spAutoFit/>
-            </a:bodyPr>
-            <a:lstStyle/>
-            <a:p>
-              <a:r>
-                <a:rPr lang="en-US" sz="2800" dirty="0">
-                  <a:latin typeface="Georgia Pro Semibold" pitchFamily="18" charset="0"/>
-                </a:rPr>
-                <a:t>Object-Oriented Internet</a:t>
-              </a:r>
-              <a:endParaRPr lang="pl-PL" sz="2800" dirty="0">
-                <a:latin typeface="Georgia Pro Semibold" pitchFamily="18" charset="0"/>
-              </a:endParaRPr>
-            </a:p>
-            <a:p>
-              <a:r>
-                <a:rPr lang="pl-PL" dirty="0">
-                  <a:latin typeface="Georgia Pro Semibold" pitchFamily="18" charset="0"/>
-                </a:rPr>
-                <a:t>OPC UA, DOA, M2M, </a:t>
-              </a:r>
-              <a:r>
-                <a:rPr lang="pl-PL" dirty="0" err="1">
-                  <a:latin typeface="Georgia Pro Semibold" pitchFamily="18" charset="0"/>
-                </a:rPr>
-                <a:t>IoT</a:t>
-              </a:r>
-              <a:r>
-                <a:rPr lang="pl-PL" dirty="0">
-                  <a:latin typeface="Georgia Pro Semibold" pitchFamily="18" charset="0"/>
-                </a:rPr>
-                <a:t>, I40</a:t>
-              </a:r>
-              <a:endParaRPr lang="en-US" dirty="0">
-                <a:latin typeface="Georgia Pro Semibold" pitchFamily="18" charset="0"/>
-              </a:endParaRPr>
-            </a:p>
-          </p:txBody>
-        </p:sp>
-      </p:grpSp>
+          <a:prstGeom prst="rect">
+            <a:avLst/>
+          </a:prstGeom>
+        </p:spPr>
+      </p:pic>
       <p:sp>
         <p:nvSpPr>
           <p:cNvPr id="2" name="Oval 1">
@@ -3972,6 +3925,207 @@
         <p:spPr>
           <a:xfrm>
             <a:off x="2999719" y="3903455"/>
+            <a:ext cx="2369559" cy="400110"/>
+          </a:xfrm>
+          <a:prstGeom prst="rect">
+            <a:avLst/>
+          </a:prstGeom>
+          <a:noFill/>
+        </p:spPr>
+        <p:txBody>
+          <a:bodyPr wrap="none" rtlCol="0">
+            <a:spAutoFit/>
+          </a:bodyPr>
+          <a:lstStyle/>
+          <a:p>
+            <a:r>
+              <a:rPr lang="pl-PL" sz="2000" dirty="0">
+                <a:latin typeface="Georgia Pro Semibold" panose="02040702050405020303" pitchFamily="18" charset="0"/>
+              </a:rPr>
+              <a:t>OPC UA </a:t>
+            </a:r>
+            <a:r>
+              <a:rPr lang="pl-PL" sz="2000" dirty="0" err="1">
+                <a:latin typeface="Georgia Pro Semibold" panose="02040702050405020303" pitchFamily="18" charset="0"/>
+              </a:rPr>
+              <a:t>Common</a:t>
+            </a:r>
+            <a:endParaRPr lang="en-US" sz="2000" dirty="0">
+              <a:latin typeface="Georgia Pro Semibold" panose="02040702050405020303" pitchFamily="18" charset="0"/>
+            </a:endParaRPr>
+          </a:p>
+        </p:txBody>
+      </p:sp>
+    </p:spTree>
+    <p:extLst>
+      <p:ext uri="{BB962C8B-B14F-4D97-AF65-F5344CB8AC3E}">
+        <p14:creationId xmlns:p14="http://schemas.microsoft.com/office/powerpoint/2010/main" val="998032549"/>
+      </p:ext>
+    </p:extLst>
+  </p:cSld>
+  <p:clrMapOvr>
+    <a:masterClrMapping/>
+  </p:clrMapOvr>
+</p:sld>
+</file>
+
+<file path=ppt/slides/slide5.xml><?xml version="1.0" encoding="utf-8"?>
+<p:sld xmlns:a="http://schemas.openxmlformats.org/drawingml/2006/main" xmlns:r="http://schemas.openxmlformats.org/officeDocument/2006/relationships" xmlns:p="http://schemas.openxmlformats.org/presentationml/2006/main">
+  <p:cSld>
+    <p:spTree>
+      <p:nvGrpSpPr>
+        <p:cNvPr id="1" name=""/>
+        <p:cNvGrpSpPr/>
+        <p:nvPr/>
+      </p:nvGrpSpPr>
+      <p:grpSpPr>
+        <a:xfrm>
+          <a:off x="0" y="0"/>
+          <a:ext cx="0" cy="0"/>
+          <a:chOff x="0" y="0"/>
+          <a:chExt cx="0" cy="0"/>
+        </a:xfrm>
+      </p:grpSpPr>
+      <p:pic>
+        <p:nvPicPr>
+          <p:cNvPr id="3" name="Picture 2">
+            <a:extLst>
+              <a:ext uri="{FF2B5EF4-FFF2-40B4-BE49-F238E27FC236}">
+                <a16:creationId xmlns:a16="http://schemas.microsoft.com/office/drawing/2014/main" id="{F1AEECE1-2318-43F8-BC12-408E691B2BE5}"/>
+              </a:ext>
+            </a:extLst>
+          </p:cNvPr>
+          <p:cNvPicPr>
+            <a:picLocks noChangeAspect="1"/>
+          </p:cNvPicPr>
+          <p:nvPr/>
+        </p:nvPicPr>
+        <p:blipFill>
+          <a:blip r:embed="rId2"/>
+          <a:stretch>
+            <a:fillRect/>
+          </a:stretch>
+        </p:blipFill>
+        <p:spPr>
+          <a:xfrm>
+            <a:off x="1895624" y="2950422"/>
+            <a:ext cx="5352752" cy="957155"/>
+          </a:xfrm>
+          <a:prstGeom prst="rect">
+            <a:avLst/>
+          </a:prstGeom>
+        </p:spPr>
+      </p:pic>
+      <p:sp>
+        <p:nvSpPr>
+          <p:cNvPr id="2" name="Oval 1">
+            <a:extLst>
+              <a:ext uri="{FF2B5EF4-FFF2-40B4-BE49-F238E27FC236}">
+                <a16:creationId xmlns:a16="http://schemas.microsoft.com/office/drawing/2014/main" id="{CC93748C-58F6-4640-904F-3E5F5E9E287F}"/>
+              </a:ext>
+            </a:extLst>
+          </p:cNvPr>
+          <p:cNvSpPr/>
+          <p:nvPr/>
+        </p:nvSpPr>
+        <p:spPr>
+          <a:xfrm>
+            <a:off x="2699792" y="3933056"/>
+            <a:ext cx="255734" cy="288032"/>
+          </a:xfrm>
+          <a:prstGeom prst="ellipse">
+            <a:avLst/>
+          </a:prstGeom>
+          <a:solidFill>
+            <a:srgbClr val="70DB76"/>
+          </a:solidFill>
+          <a:ln>
+            <a:noFill/>
+          </a:ln>
+        </p:spPr>
+        <p:style>
+          <a:lnRef idx="2">
+            <a:schemeClr val="accent1">
+              <a:shade val="50000"/>
+            </a:schemeClr>
+          </a:lnRef>
+          <a:fillRef idx="1">
+            <a:schemeClr val="accent1"/>
+          </a:fillRef>
+          <a:effectRef idx="0">
+            <a:schemeClr val="accent1"/>
+          </a:effectRef>
+          <a:fontRef idx="minor">
+            <a:schemeClr val="lt1"/>
+          </a:fontRef>
+        </p:style>
+        <p:txBody>
+          <a:bodyPr rtlCol="0" anchor="ctr"/>
+          <a:lstStyle/>
+          <a:p>
+            <a:pPr algn="ctr"/>
+            <a:endParaRPr lang="pl-PL"/>
+          </a:p>
+        </p:txBody>
+      </p:sp>
+      <p:cxnSp>
+        <p:nvCxnSpPr>
+          <p:cNvPr id="6" name="Straight Connector 5">
+            <a:extLst>
+              <a:ext uri="{FF2B5EF4-FFF2-40B4-BE49-F238E27FC236}">
+                <a16:creationId xmlns:a16="http://schemas.microsoft.com/office/drawing/2014/main" id="{B383380F-7DCD-4B2A-992C-137A10A0B850}"/>
+              </a:ext>
+            </a:extLst>
+          </p:cNvPr>
+          <p:cNvCxnSpPr>
+            <a:endCxn id="2" idx="0"/>
+          </p:cNvCxnSpPr>
+          <p:nvPr/>
+        </p:nvCxnSpPr>
+        <p:spPr>
+          <a:xfrm>
+            <a:off x="2451470" y="3501008"/>
+            <a:ext cx="376189" cy="432048"/>
+          </a:xfrm>
+          <a:prstGeom prst="line">
+            <a:avLst/>
+          </a:prstGeom>
+          <a:ln>
+            <a:solidFill>
+              <a:srgbClr val="70DB76"/>
+            </a:solidFill>
+          </a:ln>
+        </p:spPr>
+        <p:style>
+          <a:lnRef idx="1">
+            <a:schemeClr val="accent1"/>
+          </a:lnRef>
+          <a:fillRef idx="0">
+            <a:schemeClr val="accent1"/>
+          </a:fillRef>
+          <a:effectRef idx="0">
+            <a:schemeClr val="accent1"/>
+          </a:effectRef>
+          <a:fontRef idx="minor">
+            <a:schemeClr val="tx1"/>
+          </a:fontRef>
+        </p:style>
+      </p:cxnSp>
+      <p:sp>
+        <p:nvSpPr>
+          <p:cNvPr id="8" name="TextBox 7">
+            <a:extLst>
+              <a:ext uri="{FF2B5EF4-FFF2-40B4-BE49-F238E27FC236}">
+                <a16:creationId xmlns:a16="http://schemas.microsoft.com/office/drawing/2014/main" id="{9BF17666-57E6-4882-85AB-A7DBEA5EF928}"/>
+              </a:ext>
+            </a:extLst>
+          </p:cNvPr>
+          <p:cNvSpPr txBox="1"/>
+          <p:nvPr/>
+        </p:nvSpPr>
+        <p:spPr>
+          <a:xfrm>
+            <a:off x="2999719" y="3903455"/>
             <a:ext cx="2321469" cy="400110"/>
           </a:xfrm>
           <a:prstGeom prst="rect">
@@ -4033,7 +4187,7 @@
     </p:spTree>
     <p:extLst>
       <p:ext uri="{BB962C8B-B14F-4D97-AF65-F5344CB8AC3E}">
-        <p14:creationId xmlns:p14="http://schemas.microsoft.com/office/powerpoint/2010/main" val="998032549"/>
+        <p14:creationId xmlns:p14="http://schemas.microsoft.com/office/powerpoint/2010/main" val="746334728"/>
       </p:ext>
     </p:extLst>
   </p:cSld>

</xml_diff>